<commit_message>
Angle bug fixed. Adding new poster version.
</commit_message>
<xml_diff>
--- a/Resources/poster_v_0_0_3.pptx
+++ b/Resources/poster_v_0_0_3.pptx
@@ -1719,16 +1719,24 @@
   <pc:docChgLst>
     <pc:chgData name="Amir Kirshenzvige" userId="fbaaffd5-9cb7-4c06-8e4b-7fc21054e3b2" providerId="ADAL" clId="{1ABA3F46-DA6A-4CD5-AF76-581ECD79F8EC}"/>
     <pc:docChg chg="modSld">
-      <pc:chgData name="Amir Kirshenzvige" userId="fbaaffd5-9cb7-4c06-8e4b-7fc21054e3b2" providerId="ADAL" clId="{1ABA3F46-DA6A-4CD5-AF76-581ECD79F8EC}" dt="2023-07-24T14:36:25.475" v="7" actId="20577"/>
+      <pc:chgData name="Amir Kirshenzvige" userId="fbaaffd5-9cb7-4c06-8e4b-7fc21054e3b2" providerId="ADAL" clId="{1ABA3F46-DA6A-4CD5-AF76-581ECD79F8EC}" dt="2023-08-11T08:12:20.550" v="8" actId="20577"/>
       <pc:docMkLst>
         <pc:docMk/>
       </pc:docMkLst>
       <pc:sldChg chg="modSp mod">
-        <pc:chgData name="Amir Kirshenzvige" userId="fbaaffd5-9cb7-4c06-8e4b-7fc21054e3b2" providerId="ADAL" clId="{1ABA3F46-DA6A-4CD5-AF76-581ECD79F8EC}" dt="2023-07-24T14:36:25.475" v="7" actId="20577"/>
+        <pc:chgData name="Amir Kirshenzvige" userId="fbaaffd5-9cb7-4c06-8e4b-7fc21054e3b2" providerId="ADAL" clId="{1ABA3F46-DA6A-4CD5-AF76-581ECD79F8EC}" dt="2023-08-11T08:12:20.550" v="8" actId="20577"/>
         <pc:sldMkLst>
           <pc:docMk/>
           <pc:sldMk cId="0" sldId="256"/>
         </pc:sldMkLst>
+        <pc:spChg chg="mod">
+          <ac:chgData name="Amir Kirshenzvige" userId="fbaaffd5-9cb7-4c06-8e4b-7fc21054e3b2" providerId="ADAL" clId="{1ABA3F46-DA6A-4CD5-AF76-581ECD79F8EC}" dt="2023-08-11T08:12:20.550" v="8" actId="20577"/>
+          <ac:spMkLst>
+            <pc:docMk/>
+            <pc:sldMk cId="0" sldId="256"/>
+            <ac:spMk id="90" creationId="{53421EA4-8E37-9CEB-515C-B2C0D3959D7F}"/>
+          </ac:spMkLst>
+        </pc:spChg>
         <pc:spChg chg="mod">
           <ac:chgData name="Amir Kirshenzvige" userId="fbaaffd5-9cb7-4c06-8e4b-7fc21054e3b2" providerId="ADAL" clId="{1ABA3F46-DA6A-4CD5-AF76-581ECD79F8EC}" dt="2023-07-24T14:36:25.475" v="7" actId="20577"/>
           <ac:spMkLst>
@@ -1843,7 +1851,7 @@
               <a:pPr>
                 <a:defRPr/>
               </a:pPr>
-              <a:t>ו'/אב/תשפ"ג</a:t>
+              <a:t>כ"ד/אב/תשפ"ג</a:t>
             </a:fld>
             <a:endParaRPr lang="he-IL"/>
           </a:p>
@@ -2019,7 +2027,7 @@
           <a:p>
             <a:fld id="{5EA46A1A-7B25-476C-AFF8-F34B15990641}" type="datetimeFigureOut">
               <a:rPr lang="en-US" smtClean="0"/>
-              <a:t>7/24/2023</a:t>
+              <a:t>8/11/2023</a:t>
             </a:fld>
             <a:endParaRPr lang="en-US"/>
           </a:p>
@@ -2564,7 +2572,7 @@
               <a:pPr>
                 <a:defRPr/>
               </a:pPr>
-              <a:t>ו'/אב/תשפ"ג</a:t>
+              <a:t>כ"ד/אב/תשפ"ג</a:t>
             </a:fld>
             <a:endParaRPr lang="he-IL"/>
           </a:p>
@@ -2754,7 +2762,7 @@
               <a:pPr>
                 <a:defRPr/>
               </a:pPr>
-              <a:t>ו'/אב/תשפ"ג</a:t>
+              <a:t>כ"ד/אב/תשפ"ג</a:t>
             </a:fld>
             <a:endParaRPr lang="he-IL"/>
           </a:p>
@@ -2954,7 +2962,7 @@
               <a:pPr>
                 <a:defRPr/>
               </a:pPr>
-              <a:t>ו'/אב/תשפ"ג</a:t>
+              <a:t>כ"ד/אב/תשפ"ג</a:t>
             </a:fld>
             <a:endParaRPr lang="he-IL"/>
           </a:p>
@@ -3084,7 +3092,7 @@
           <a:noFill/>
           <a:extLst>
             <a:ext uri="{909E8E84-426E-40dd-AFC4-6F175D3DCCD1}">
-              <a14:hiddenFill xmlns="" xmlns:a14="http://schemas.microsoft.com/office/drawing/2010/main">
+              <a14:hiddenFill xmlns:a14="http://schemas.microsoft.com/office/drawing/2010/main" xmlns="">
                 <a:solidFill>
                   <a:srgbClr val="FFFFFF"/>
                 </a:solidFill>
@@ -3143,7 +3151,7 @@
             </a:ln>
             <a:extLst>
               <a:ext uri="{91240B29-F687-4f45-9708-019B960494DF}">
-                <a14:hiddenLine xmlns="" xmlns:a14="http://schemas.microsoft.com/office/drawing/2010/main" w="9525">
+                <a14:hiddenLine xmlns:a14="http://schemas.microsoft.com/office/drawing/2010/main" xmlns="" w="9525">
                   <a:solidFill>
                     <a:srgbClr val="000000"/>
                   </a:solidFill>
@@ -3233,7 +3241,7 @@
             </a:ln>
             <a:extLst>
               <a:ext uri="{91240B29-F687-4f45-9708-019B960494DF}">
-                <a14:hiddenLine xmlns="" xmlns:a14="http://schemas.microsoft.com/office/drawing/2010/main" w="9525">
+                <a14:hiddenLine xmlns:a14="http://schemas.microsoft.com/office/drawing/2010/main" xmlns="" w="9525">
                   <a:solidFill>
                     <a:srgbClr val="000000"/>
                   </a:solidFill>
@@ -3323,7 +3331,7 @@
             </a:ln>
             <a:extLst>
               <a:ext uri="{91240B29-F687-4f45-9708-019B960494DF}">
-                <a14:hiddenLine xmlns="" xmlns:a14="http://schemas.microsoft.com/office/drawing/2010/main" w="9525">
+                <a14:hiddenLine xmlns:a14="http://schemas.microsoft.com/office/drawing/2010/main" xmlns="" w="9525">
                   <a:solidFill>
                     <a:srgbClr val="000000"/>
                   </a:solidFill>
@@ -3357,7 +3365,7 @@
             </a:ln>
             <a:extLst>
               <a:ext uri="{91240B29-F687-4f45-9708-019B960494DF}">
-                <a14:hiddenLine xmlns="" xmlns:a14="http://schemas.microsoft.com/office/drawing/2010/main" w="9525">
+                <a14:hiddenLine xmlns:a14="http://schemas.microsoft.com/office/drawing/2010/main" xmlns="" w="9525">
                   <a:solidFill>
                     <a:srgbClr val="000000"/>
                   </a:solidFill>
@@ -3447,7 +3455,7 @@
             </a:ln>
             <a:extLst>
               <a:ext uri="{91240B29-F687-4f45-9708-019B960494DF}">
-                <a14:hiddenLine xmlns="" xmlns:a14="http://schemas.microsoft.com/office/drawing/2010/main" w="9525">
+                <a14:hiddenLine xmlns:a14="http://schemas.microsoft.com/office/drawing/2010/main" xmlns="" w="9525">
                   <a:solidFill>
                     <a:srgbClr val="000000"/>
                   </a:solidFill>
@@ -3509,7 +3517,7 @@
             </a:ln>
             <a:extLst>
               <a:ext uri="{91240B29-F687-4f45-9708-019B960494DF}">
-                <a14:hiddenLine xmlns="" xmlns:a14="http://schemas.microsoft.com/office/drawing/2010/main" w="9525">
+                <a14:hiddenLine xmlns:a14="http://schemas.microsoft.com/office/drawing/2010/main" xmlns="" w="9525">
                   <a:solidFill>
                     <a:srgbClr val="000000"/>
                   </a:solidFill>
@@ -3571,7 +3579,7 @@
             </a:ln>
             <a:extLst>
               <a:ext uri="{91240B29-F687-4f45-9708-019B960494DF}">
-                <a14:hiddenLine xmlns="" xmlns:a14="http://schemas.microsoft.com/office/drawing/2010/main" w="9525">
+                <a14:hiddenLine xmlns:a14="http://schemas.microsoft.com/office/drawing/2010/main" xmlns="" w="9525">
                   <a:solidFill>
                     <a:srgbClr val="000000"/>
                   </a:solidFill>
@@ -3661,7 +3669,7 @@
             </a:ln>
             <a:extLst>
               <a:ext uri="{91240B29-F687-4f45-9708-019B960494DF}">
-                <a14:hiddenLine xmlns="" xmlns:a14="http://schemas.microsoft.com/office/drawing/2010/main" w="9525">
+                <a14:hiddenLine xmlns:a14="http://schemas.microsoft.com/office/drawing/2010/main" xmlns="" w="9525">
                   <a:solidFill>
                     <a:srgbClr val="000000"/>
                   </a:solidFill>
@@ -3723,7 +3731,7 @@
             </a:ln>
             <a:extLst>
               <a:ext uri="{91240B29-F687-4f45-9708-019B960494DF}">
-                <a14:hiddenLine xmlns="" xmlns:a14="http://schemas.microsoft.com/office/drawing/2010/main" w="9525">
+                <a14:hiddenLine xmlns:a14="http://schemas.microsoft.com/office/drawing/2010/main" xmlns="" w="9525">
                   <a:solidFill>
                     <a:srgbClr val="000000"/>
                   </a:solidFill>
@@ -3785,7 +3793,7 @@
             </a:ln>
             <a:extLst>
               <a:ext uri="{91240B29-F687-4f45-9708-019B960494DF}">
-                <a14:hiddenLine xmlns="" xmlns:a14="http://schemas.microsoft.com/office/drawing/2010/main" w="9525">
+                <a14:hiddenLine xmlns:a14="http://schemas.microsoft.com/office/drawing/2010/main" xmlns="" w="9525">
                   <a:solidFill>
                     <a:srgbClr val="000000"/>
                   </a:solidFill>
@@ -3875,7 +3883,7 @@
             </a:ln>
             <a:extLst>
               <a:ext uri="{91240B29-F687-4f45-9708-019B960494DF}">
-                <a14:hiddenLine xmlns="" xmlns:a14="http://schemas.microsoft.com/office/drawing/2010/main" w="9525">
+                <a14:hiddenLine xmlns:a14="http://schemas.microsoft.com/office/drawing/2010/main" xmlns="" w="9525">
                   <a:solidFill>
                     <a:srgbClr val="000000"/>
                   </a:solidFill>
@@ -3965,7 +3973,7 @@
             </a:ln>
             <a:extLst>
               <a:ext uri="{91240B29-F687-4f45-9708-019B960494DF}">
-                <a14:hiddenLine xmlns="" xmlns:a14="http://schemas.microsoft.com/office/drawing/2010/main" w="9525">
+                <a14:hiddenLine xmlns:a14="http://schemas.microsoft.com/office/drawing/2010/main" xmlns="" w="9525">
                   <a:solidFill>
                     <a:srgbClr val="000000"/>
                   </a:solidFill>
@@ -4027,7 +4035,7 @@
             </a:ln>
             <a:extLst>
               <a:ext uri="{91240B29-F687-4f45-9708-019B960494DF}">
-                <a14:hiddenLine xmlns="" xmlns:a14="http://schemas.microsoft.com/office/drawing/2010/main" w="9525">
+                <a14:hiddenLine xmlns:a14="http://schemas.microsoft.com/office/drawing/2010/main" xmlns="" w="9525">
                   <a:solidFill>
                     <a:srgbClr val="000000"/>
                   </a:solidFill>
@@ -4137,7 +4145,7 @@
             </a:ln>
             <a:extLst>
               <a:ext uri="{91240B29-F687-4f45-9708-019B960494DF}">
-                <a14:hiddenLine xmlns="" xmlns:a14="http://schemas.microsoft.com/office/drawing/2010/main" w="9525">
+                <a14:hiddenLine xmlns:a14="http://schemas.microsoft.com/office/drawing/2010/main" xmlns="" w="9525">
                   <a:solidFill>
                     <a:srgbClr val="000000"/>
                   </a:solidFill>
@@ -4199,7 +4207,7 @@
             </a:ln>
             <a:extLst>
               <a:ext uri="{91240B29-F687-4f45-9708-019B960494DF}">
-                <a14:hiddenLine xmlns="" xmlns:a14="http://schemas.microsoft.com/office/drawing/2010/main" w="9525">
+                <a14:hiddenLine xmlns:a14="http://schemas.microsoft.com/office/drawing/2010/main" xmlns="" w="9525">
                   <a:solidFill>
                     <a:srgbClr val="000000"/>
                   </a:solidFill>
@@ -4289,7 +4297,7 @@
             </a:ln>
             <a:extLst>
               <a:ext uri="{91240B29-F687-4f45-9708-019B960494DF}">
-                <a14:hiddenLine xmlns="" xmlns:a14="http://schemas.microsoft.com/office/drawing/2010/main" w="9525">
+                <a14:hiddenLine xmlns:a14="http://schemas.microsoft.com/office/drawing/2010/main" xmlns="" w="9525">
                   <a:solidFill>
                     <a:srgbClr val="000000"/>
                   </a:solidFill>
@@ -4379,7 +4387,7 @@
             </a:ln>
             <a:extLst>
               <a:ext uri="{91240B29-F687-4f45-9708-019B960494DF}">
-                <a14:hiddenLine xmlns="" xmlns:a14="http://schemas.microsoft.com/office/drawing/2010/main" w="9525">
+                <a14:hiddenLine xmlns:a14="http://schemas.microsoft.com/office/drawing/2010/main" xmlns="" w="9525">
                   <a:solidFill>
                     <a:srgbClr val="000000"/>
                   </a:solidFill>
@@ -4441,7 +4449,7 @@
             </a:ln>
             <a:extLst>
               <a:ext uri="{91240B29-F687-4f45-9708-019B960494DF}">
-                <a14:hiddenLine xmlns="" xmlns:a14="http://schemas.microsoft.com/office/drawing/2010/main" w="9525">
+                <a14:hiddenLine xmlns:a14="http://schemas.microsoft.com/office/drawing/2010/main" xmlns="" w="9525">
                   <a:solidFill>
                     <a:srgbClr val="000000"/>
                   </a:solidFill>
@@ -4531,7 +4539,7 @@
             </a:ln>
             <a:extLst>
               <a:ext uri="{91240B29-F687-4f45-9708-019B960494DF}">
-                <a14:hiddenLine xmlns="" xmlns:a14="http://schemas.microsoft.com/office/drawing/2010/main" w="9525">
+                <a14:hiddenLine xmlns:a14="http://schemas.microsoft.com/office/drawing/2010/main" xmlns="" w="9525">
                   <a:solidFill>
                     <a:srgbClr val="000000"/>
                   </a:solidFill>
@@ -4621,7 +4629,7 @@
             </a:ln>
             <a:extLst>
               <a:ext uri="{91240B29-F687-4f45-9708-019B960494DF}">
-                <a14:hiddenLine xmlns="" xmlns:a14="http://schemas.microsoft.com/office/drawing/2010/main" w="9525">
+                <a14:hiddenLine xmlns:a14="http://schemas.microsoft.com/office/drawing/2010/main" xmlns="" w="9525">
                   <a:solidFill>
                     <a:srgbClr val="000000"/>
                   </a:solidFill>
@@ -4677,7 +4685,7 @@
             </a:ln>
             <a:extLst>
               <a:ext uri="{91240B29-F687-4f45-9708-019B960494DF}">
-                <a14:hiddenLine xmlns="" xmlns:a14="http://schemas.microsoft.com/office/drawing/2010/main" w="9525">
+                <a14:hiddenLine xmlns:a14="http://schemas.microsoft.com/office/drawing/2010/main" xmlns="" w="9525">
                   <a:solidFill>
                     <a:srgbClr val="000000"/>
                   </a:solidFill>
@@ -4767,7 +4775,7 @@
             </a:ln>
             <a:extLst>
               <a:ext uri="{91240B29-F687-4f45-9708-019B960494DF}">
-                <a14:hiddenLine xmlns="" xmlns:a14="http://schemas.microsoft.com/office/drawing/2010/main" w="9525">
+                <a14:hiddenLine xmlns:a14="http://schemas.microsoft.com/office/drawing/2010/main" xmlns="" w="9525">
                   <a:solidFill>
                     <a:srgbClr val="000000"/>
                   </a:solidFill>
@@ -4823,7 +4831,7 @@
             </a:ln>
             <a:extLst>
               <a:ext uri="{91240B29-F687-4f45-9708-019B960494DF}">
-                <a14:hiddenLine xmlns="" xmlns:a14="http://schemas.microsoft.com/office/drawing/2010/main" w="9525">
+                <a14:hiddenLine xmlns:a14="http://schemas.microsoft.com/office/drawing/2010/main" xmlns="" w="9525">
                   <a:solidFill>
                     <a:srgbClr val="000000"/>
                   </a:solidFill>
@@ -4913,7 +4921,7 @@
             </a:ln>
             <a:extLst>
               <a:ext uri="{91240B29-F687-4f45-9708-019B960494DF}">
-                <a14:hiddenLine xmlns="" xmlns:a14="http://schemas.microsoft.com/office/drawing/2010/main" w="9525">
+                <a14:hiddenLine xmlns:a14="http://schemas.microsoft.com/office/drawing/2010/main" xmlns="" w="9525">
                   <a:solidFill>
                     <a:srgbClr val="000000"/>
                   </a:solidFill>
@@ -4981,7 +4989,7 @@
             </a:ln>
             <a:extLst>
               <a:ext uri="{91240B29-F687-4f45-9708-019B960494DF}">
-                <a14:hiddenLine xmlns="" xmlns:a14="http://schemas.microsoft.com/office/drawing/2010/main" w="9525">
+                <a14:hiddenLine xmlns:a14="http://schemas.microsoft.com/office/drawing/2010/main" xmlns="" w="9525">
                   <a:solidFill>
                     <a:srgbClr val="000000"/>
                   </a:solidFill>
@@ -5071,7 +5079,7 @@
             </a:ln>
             <a:extLst>
               <a:ext uri="{91240B29-F687-4f45-9708-019B960494DF}">
-                <a14:hiddenLine xmlns="" xmlns:a14="http://schemas.microsoft.com/office/drawing/2010/main" w="9525">
+                <a14:hiddenLine xmlns:a14="http://schemas.microsoft.com/office/drawing/2010/main" xmlns="" w="9525">
                   <a:solidFill>
                     <a:srgbClr val="000000"/>
                   </a:solidFill>
@@ -5139,7 +5147,7 @@
             </a:ln>
             <a:extLst>
               <a:ext uri="{91240B29-F687-4f45-9708-019B960494DF}">
-                <a14:hiddenLine xmlns="" xmlns:a14="http://schemas.microsoft.com/office/drawing/2010/main" w="9525">
+                <a14:hiddenLine xmlns:a14="http://schemas.microsoft.com/office/drawing/2010/main" xmlns="" w="9525">
                   <a:solidFill>
                     <a:srgbClr val="000000"/>
                   </a:solidFill>
@@ -5229,7 +5237,7 @@
             </a:ln>
             <a:extLst>
               <a:ext uri="{91240B29-F687-4f45-9708-019B960494DF}">
-                <a14:hiddenLine xmlns="" xmlns:a14="http://schemas.microsoft.com/office/drawing/2010/main" w="9525">
+                <a14:hiddenLine xmlns:a14="http://schemas.microsoft.com/office/drawing/2010/main" xmlns="" w="9525">
                   <a:solidFill>
                     <a:srgbClr val="000000"/>
                   </a:solidFill>
@@ -5263,7 +5271,7 @@
             </a:ln>
             <a:extLst>
               <a:ext uri="{91240B29-F687-4f45-9708-019B960494DF}">
-                <a14:hiddenLine xmlns="" xmlns:a14="http://schemas.microsoft.com/office/drawing/2010/main" w="9525">
+                <a14:hiddenLine xmlns:a14="http://schemas.microsoft.com/office/drawing/2010/main" xmlns="" w="9525">
                   <a:solidFill>
                     <a:srgbClr val="000000"/>
                   </a:solidFill>
@@ -5353,7 +5361,7 @@
             </a:ln>
             <a:extLst>
               <a:ext uri="{91240B29-F687-4f45-9708-019B960494DF}">
-                <a14:hiddenLine xmlns="" xmlns:a14="http://schemas.microsoft.com/office/drawing/2010/main" w="9525">
+                <a14:hiddenLine xmlns:a14="http://schemas.microsoft.com/office/drawing/2010/main" xmlns="" w="9525">
                   <a:solidFill>
                     <a:srgbClr val="000000"/>
                   </a:solidFill>
@@ -5415,7 +5423,7 @@
             </a:ln>
             <a:extLst>
               <a:ext uri="{91240B29-F687-4f45-9708-019B960494DF}">
-                <a14:hiddenLine xmlns="" xmlns:a14="http://schemas.microsoft.com/office/drawing/2010/main" w="9525">
+                <a14:hiddenLine xmlns:a14="http://schemas.microsoft.com/office/drawing/2010/main" xmlns="" w="9525">
                   <a:solidFill>
                     <a:srgbClr val="000000"/>
                   </a:solidFill>
@@ -5477,7 +5485,7 @@
             </a:ln>
             <a:extLst>
               <a:ext uri="{91240B29-F687-4f45-9708-019B960494DF}">
-                <a14:hiddenLine xmlns="" xmlns:a14="http://schemas.microsoft.com/office/drawing/2010/main" w="9525">
+                <a14:hiddenLine xmlns:a14="http://schemas.microsoft.com/office/drawing/2010/main" xmlns="" w="9525">
                   <a:solidFill>
                     <a:srgbClr val="000000"/>
                   </a:solidFill>
@@ -5567,7 +5575,7 @@
             </a:ln>
             <a:extLst>
               <a:ext uri="{91240B29-F687-4f45-9708-019B960494DF}">
-                <a14:hiddenLine xmlns="" xmlns:a14="http://schemas.microsoft.com/office/drawing/2010/main" w="9525">
+                <a14:hiddenLine xmlns:a14="http://schemas.microsoft.com/office/drawing/2010/main" xmlns="" w="9525">
                   <a:solidFill>
                     <a:srgbClr val="000000"/>
                   </a:solidFill>
@@ -5635,7 +5643,7 @@
             </a:ln>
             <a:extLst>
               <a:ext uri="{91240B29-F687-4f45-9708-019B960494DF}">
-                <a14:hiddenLine xmlns="" xmlns:a14="http://schemas.microsoft.com/office/drawing/2010/main" w="9525">
+                <a14:hiddenLine xmlns:a14="http://schemas.microsoft.com/office/drawing/2010/main" xmlns="" w="9525">
                   <a:solidFill>
                     <a:srgbClr val="000000"/>
                   </a:solidFill>
@@ -5697,7 +5705,7 @@
             </a:ln>
             <a:extLst>
               <a:ext uri="{91240B29-F687-4f45-9708-019B960494DF}">
-                <a14:hiddenLine xmlns="" xmlns:a14="http://schemas.microsoft.com/office/drawing/2010/main" w="9525">
+                <a14:hiddenLine xmlns:a14="http://schemas.microsoft.com/office/drawing/2010/main" xmlns="" w="9525">
                   <a:solidFill>
                     <a:srgbClr val="000000"/>
                   </a:solidFill>
@@ -5787,7 +5795,7 @@
             </a:ln>
             <a:extLst>
               <a:ext uri="{91240B29-F687-4f45-9708-019B960494DF}">
-                <a14:hiddenLine xmlns="" xmlns:a14="http://schemas.microsoft.com/office/drawing/2010/main" w="9525">
+                <a14:hiddenLine xmlns:a14="http://schemas.microsoft.com/office/drawing/2010/main" xmlns="" w="9525">
                   <a:solidFill>
                     <a:srgbClr val="000000"/>
                   </a:solidFill>
@@ -5849,7 +5857,7 @@
             </a:ln>
             <a:extLst>
               <a:ext uri="{91240B29-F687-4f45-9708-019B960494DF}">
-                <a14:hiddenLine xmlns="" xmlns:a14="http://schemas.microsoft.com/office/drawing/2010/main" w="9525">
+                <a14:hiddenLine xmlns:a14="http://schemas.microsoft.com/office/drawing/2010/main" xmlns="" w="9525">
                   <a:solidFill>
                     <a:srgbClr val="000000"/>
                   </a:solidFill>
@@ -5939,7 +5947,7 @@
             </a:ln>
             <a:extLst>
               <a:ext uri="{91240B29-F687-4f45-9708-019B960494DF}">
-                <a14:hiddenLine xmlns="" xmlns:a14="http://schemas.microsoft.com/office/drawing/2010/main" w="9525">
+                <a14:hiddenLine xmlns:a14="http://schemas.microsoft.com/office/drawing/2010/main" xmlns="" w="9525">
                   <a:solidFill>
                     <a:srgbClr val="000000"/>
                   </a:solidFill>
@@ -6001,7 +6009,7 @@
             </a:ln>
             <a:extLst>
               <a:ext uri="{91240B29-F687-4f45-9708-019B960494DF}">
-                <a14:hiddenLine xmlns="" xmlns:a14="http://schemas.microsoft.com/office/drawing/2010/main" w="9525">
+                <a14:hiddenLine xmlns:a14="http://schemas.microsoft.com/office/drawing/2010/main" xmlns="" w="9525">
                   <a:solidFill>
                     <a:srgbClr val="000000"/>
                   </a:solidFill>
@@ -6091,7 +6099,7 @@
             </a:ln>
             <a:extLst>
               <a:ext uri="{91240B29-F687-4f45-9708-019B960494DF}">
-                <a14:hiddenLine xmlns="" xmlns:a14="http://schemas.microsoft.com/office/drawing/2010/main" w="9525">
+                <a14:hiddenLine xmlns:a14="http://schemas.microsoft.com/office/drawing/2010/main" xmlns="" w="9525">
                   <a:solidFill>
                     <a:srgbClr val="000000"/>
                   </a:solidFill>
@@ -6125,7 +6133,7 @@
             </a:ln>
             <a:extLst>
               <a:ext uri="{91240B29-F687-4f45-9708-019B960494DF}">
-                <a14:hiddenLine xmlns="" xmlns:a14="http://schemas.microsoft.com/office/drawing/2010/main" w="9525">
+                <a14:hiddenLine xmlns:a14="http://schemas.microsoft.com/office/drawing/2010/main" xmlns="" w="9525">
                   <a:solidFill>
                     <a:srgbClr val="000000"/>
                   </a:solidFill>
@@ -6190,7 +6198,7 @@
             </a:ln>
             <a:extLst>
               <a:ext uri="{91240B29-F687-4f45-9708-019B960494DF}">
-                <a14:hiddenLine xmlns="" xmlns:a14="http://schemas.microsoft.com/office/drawing/2010/main" w="9525">
+                <a14:hiddenLine xmlns:a14="http://schemas.microsoft.com/office/drawing/2010/main" xmlns="" w="9525">
                   <a:solidFill>
                     <a:srgbClr val="000000"/>
                   </a:solidFill>
@@ -6280,7 +6288,7 @@
             </a:ln>
             <a:extLst>
               <a:ext uri="{91240B29-F687-4f45-9708-019B960494DF}">
-                <a14:hiddenLine xmlns="" xmlns:a14="http://schemas.microsoft.com/office/drawing/2010/main" w="9525">
+                <a14:hiddenLine xmlns:a14="http://schemas.microsoft.com/office/drawing/2010/main" xmlns="" w="9525">
                   <a:solidFill>
                     <a:srgbClr val="000000"/>
                   </a:solidFill>
@@ -6342,7 +6350,7 @@
             </a:ln>
             <a:extLst>
               <a:ext uri="{91240B29-F687-4f45-9708-019B960494DF}">
-                <a14:hiddenLine xmlns="" xmlns:a14="http://schemas.microsoft.com/office/drawing/2010/main" w="9525">
+                <a14:hiddenLine xmlns:a14="http://schemas.microsoft.com/office/drawing/2010/main" xmlns="" w="9525">
                   <a:solidFill>
                     <a:srgbClr val="000000"/>
                   </a:solidFill>
@@ -6432,7 +6440,7 @@
             </a:ln>
             <a:extLst>
               <a:ext uri="{91240B29-F687-4f45-9708-019B960494DF}">
-                <a14:hiddenLine xmlns="" xmlns:a14="http://schemas.microsoft.com/office/drawing/2010/main" w="9525">
+                <a14:hiddenLine xmlns:a14="http://schemas.microsoft.com/office/drawing/2010/main" xmlns="" w="9525">
                   <a:solidFill>
                     <a:srgbClr val="000000"/>
                   </a:solidFill>
@@ -6522,7 +6530,7 @@
             </a:ln>
             <a:extLst>
               <a:ext uri="{91240B29-F687-4f45-9708-019B960494DF}">
-                <a14:hiddenLine xmlns="" xmlns:a14="http://schemas.microsoft.com/office/drawing/2010/main" w="9525">
+                <a14:hiddenLine xmlns:a14="http://schemas.microsoft.com/office/drawing/2010/main" xmlns="" w="9525">
                   <a:solidFill>
                     <a:srgbClr val="000000"/>
                   </a:solidFill>
@@ -6587,7 +6595,7 @@
             </a:ln>
             <a:extLst>
               <a:ext uri="{91240B29-F687-4f45-9708-019B960494DF}">
-                <a14:hiddenLine xmlns="" xmlns:a14="http://schemas.microsoft.com/office/drawing/2010/main" w="9525">
+                <a14:hiddenLine xmlns:a14="http://schemas.microsoft.com/office/drawing/2010/main" xmlns="" w="9525">
                   <a:solidFill>
                     <a:srgbClr val="000000"/>
                   </a:solidFill>
@@ -6649,7 +6657,7 @@
             </a:ln>
             <a:extLst>
               <a:ext uri="{91240B29-F687-4f45-9708-019B960494DF}">
-                <a14:hiddenLine xmlns="" xmlns:a14="http://schemas.microsoft.com/office/drawing/2010/main" w="9525">
+                <a14:hiddenLine xmlns:a14="http://schemas.microsoft.com/office/drawing/2010/main" xmlns="" w="9525">
                   <a:solidFill>
                     <a:srgbClr val="000000"/>
                   </a:solidFill>
@@ -6739,7 +6747,7 @@
             </a:ln>
             <a:extLst>
               <a:ext uri="{91240B29-F687-4f45-9708-019B960494DF}">
-                <a14:hiddenLine xmlns="" xmlns:a14="http://schemas.microsoft.com/office/drawing/2010/main" w="9525">
+                <a14:hiddenLine xmlns:a14="http://schemas.microsoft.com/office/drawing/2010/main" xmlns="" w="9525">
                   <a:solidFill>
                     <a:srgbClr val="000000"/>
                   </a:solidFill>
@@ -6829,7 +6837,7 @@
             </a:ln>
             <a:extLst>
               <a:ext uri="{91240B29-F687-4f45-9708-019B960494DF}">
-                <a14:hiddenLine xmlns="" xmlns:a14="http://schemas.microsoft.com/office/drawing/2010/main" w="9525">
+                <a14:hiddenLine xmlns:a14="http://schemas.microsoft.com/office/drawing/2010/main" xmlns="" w="9525">
                   <a:solidFill>
                     <a:srgbClr val="000000"/>
                   </a:solidFill>
@@ -6891,7 +6899,7 @@
             </a:ln>
             <a:extLst>
               <a:ext uri="{91240B29-F687-4f45-9708-019B960494DF}">
-                <a14:hiddenLine xmlns="" xmlns:a14="http://schemas.microsoft.com/office/drawing/2010/main" w="9525">
+                <a14:hiddenLine xmlns:a14="http://schemas.microsoft.com/office/drawing/2010/main" xmlns="" w="9525">
                   <a:solidFill>
                     <a:srgbClr val="000000"/>
                   </a:solidFill>
@@ -7011,7 +7019,7 @@
             </a:ln>
             <a:extLst>
               <a:ext uri="{91240B29-F687-4f45-9708-019B960494DF}">
-                <a14:hiddenLine xmlns="" xmlns:a14="http://schemas.microsoft.com/office/drawing/2010/main" w="9525">
+                <a14:hiddenLine xmlns:a14="http://schemas.microsoft.com/office/drawing/2010/main" xmlns="" w="9525">
                   <a:solidFill>
                     <a:srgbClr val="000000"/>
                   </a:solidFill>
@@ -7079,7 +7087,7 @@
             </a:ln>
             <a:extLst>
               <a:ext uri="{91240B29-F687-4f45-9708-019B960494DF}">
-                <a14:hiddenLine xmlns="" xmlns:a14="http://schemas.microsoft.com/office/drawing/2010/main" w="9525">
+                <a14:hiddenLine xmlns:a14="http://schemas.microsoft.com/office/drawing/2010/main" xmlns="" w="9525">
                   <a:solidFill>
                     <a:srgbClr val="000000"/>
                   </a:solidFill>
@@ -7169,7 +7177,7 @@
             </a:ln>
             <a:extLst>
               <a:ext uri="{91240B29-F687-4f45-9708-019B960494DF}">
-                <a14:hiddenLine xmlns="" xmlns:a14="http://schemas.microsoft.com/office/drawing/2010/main" w="9525">
+                <a14:hiddenLine xmlns:a14="http://schemas.microsoft.com/office/drawing/2010/main" xmlns="" w="9525">
                   <a:solidFill>
                     <a:srgbClr val="000000"/>
                   </a:solidFill>
@@ -7315,7 +7323,7 @@
               <a:pPr>
                 <a:defRPr/>
               </a:pPr>
-              <a:t>ו'/אב/תשפ"ג</a:t>
+              <a:t>כ"ד/אב/תשפ"ג</a:t>
             </a:fld>
             <a:endParaRPr lang="he-IL"/>
           </a:p>
@@ -7520,7 +7528,7 @@
               <a:pPr>
                 <a:defRPr/>
               </a:pPr>
-              <a:t>ו'/אב/תשפ"ג</a:t>
+              <a:t>כ"ד/אב/תשפ"ג</a:t>
             </a:fld>
             <a:endParaRPr lang="he-IL"/>
           </a:p>
@@ -7790,7 +7798,7 @@
               <a:pPr>
                 <a:defRPr/>
               </a:pPr>
-              <a:t>ו'/אב/תשפ"ג</a:t>
+              <a:t>כ"ד/אב/תשפ"ג</a:t>
             </a:fld>
             <a:endParaRPr lang="he-IL"/>
           </a:p>
@@ -8032,7 +8040,7 @@
               <a:pPr>
                 <a:defRPr/>
               </a:pPr>
-              <a:t>ו'/אב/תשפ"ג</a:t>
+              <a:t>כ"ד/אב/תשפ"ג</a:t>
             </a:fld>
             <a:endParaRPr lang="he-IL"/>
           </a:p>
@@ -8423,7 +8431,7 @@
               <a:pPr>
                 <a:defRPr/>
               </a:pPr>
-              <a:t>ו'/אב/תשפ"ג</a:t>
+              <a:t>כ"ד/אב/תשפ"ג</a:t>
             </a:fld>
             <a:endParaRPr lang="he-IL"/>
           </a:p>
@@ -8551,7 +8559,7 @@
               <a:pPr>
                 <a:defRPr/>
               </a:pPr>
-              <a:t>ו'/אב/תשפ"ג</a:t>
+              <a:t>כ"ד/אב/תשפ"ג</a:t>
             </a:fld>
             <a:endParaRPr lang="he-IL"/>
           </a:p>
@@ -8656,7 +8664,7 @@
               <a:pPr>
                 <a:defRPr/>
               </a:pPr>
-              <a:t>ו'/אב/תשפ"ג</a:t>
+              <a:t>כ"ד/אב/תשפ"ג</a:t>
             </a:fld>
             <a:endParaRPr lang="he-IL"/>
           </a:p>
@@ -8915,7 +8923,7 @@
               <a:pPr>
                 <a:defRPr/>
               </a:pPr>
-              <a:t>ו'/אב/תשפ"ג</a:t>
+              <a:t>כ"ד/אב/תשפ"ג</a:t>
             </a:fld>
             <a:endParaRPr lang="he-IL"/>
           </a:p>
@@ -9207,7 +9215,7 @@
               <a:pPr>
                 <a:defRPr/>
               </a:pPr>
-              <a:t>ו'/אב/תשפ"ג</a:t>
+              <a:t>כ"ד/אב/תשפ"ג</a:t>
             </a:fld>
             <a:endParaRPr lang="he-IL"/>
           </a:p>
@@ -9474,7 +9482,7 @@
               <a:pPr>
                 <a:defRPr/>
               </a:pPr>
-              <a:t>ו'/אב/תשפ"ג</a:t>
+              <a:t>כ"ד/אב/תשפ"ג</a:t>
             </a:fld>
             <a:endParaRPr lang="he-IL"/>
           </a:p>
@@ -9680,7 +9688,7 @@
               <a:pPr>
                 <a:defRPr/>
               </a:pPr>
-              <a:t>ו'/אב/תשפ"ג</a:t>
+              <a:t>כ"ד/אב/תשפ"ג</a:t>
             </a:fld>
             <a:endParaRPr lang="he-IL"/>
           </a:p>
@@ -9953,7 +9961,7 @@
               <a:pPr>
                 <a:defRPr/>
               </a:pPr>
-              <a:t>ו'/אב/תשפ"ג</a:t>
+              <a:t>כ"ד/אב/תשפ"ג</a:t>
             </a:fld>
             <a:endParaRPr lang="he-IL"/>
           </a:p>
@@ -10397,7 +10405,7 @@
               <a:pPr>
                 <a:defRPr/>
               </a:pPr>
-              <a:t>ו'/אב/תשפ"ג</a:t>
+              <a:t>כ"ד/אב/תשפ"ג</a:t>
             </a:fld>
             <a:endParaRPr lang="he-IL"/>
           </a:p>
@@ -10953,7 +10961,7 @@
               <a:pPr>
                 <a:defRPr/>
               </a:pPr>
-              <a:t>ו'/אב/תשפ"ג</a:t>
+              <a:t>כ"ד/אב/תשפ"ג</a:t>
             </a:fld>
             <a:endParaRPr lang="he-IL"/>
           </a:p>
@@ -11683,7 +11691,7 @@
               <a:pPr>
                 <a:defRPr/>
               </a:pPr>
-              <a:t>ו'/אב/תשפ"ג</a:t>
+              <a:t>כ"ד/אב/תשפ"ג</a:t>
             </a:fld>
             <a:endParaRPr lang="he-IL"/>
           </a:p>
@@ -11867,7 +11875,7 @@
               <a:pPr>
                 <a:defRPr/>
               </a:pPr>
-              <a:t>ו'/אב/תשפ"ג</a:t>
+              <a:t>כ"ד/אב/תשפ"ג</a:t>
             </a:fld>
             <a:endParaRPr lang="he-IL"/>
           </a:p>
@@ -12057,7 +12065,7 @@
               <a:pPr>
                 <a:defRPr/>
               </a:pPr>
-              <a:t>ו'/אב/תשפ"ג</a:t>
+              <a:t>כ"ד/אב/תשפ"ג</a:t>
             </a:fld>
             <a:endParaRPr lang="he-IL"/>
           </a:p>
@@ -12316,7 +12324,7 @@
               <a:pPr>
                 <a:defRPr/>
               </a:pPr>
-              <a:t>ו'/אב/תשפ"ג</a:t>
+              <a:t>כ"ד/אב/תשפ"ג</a:t>
             </a:fld>
             <a:endParaRPr lang="he-IL"/>
           </a:p>
@@ -12623,7 +12631,7 @@
               <a:pPr>
                 <a:defRPr/>
               </a:pPr>
-              <a:t>ו'/אב/תשפ"ג</a:t>
+              <a:t>כ"ד/אב/תשפ"ג</a:t>
             </a:fld>
             <a:endParaRPr lang="he-IL"/>
           </a:p>
@@ -13064,7 +13072,7 @@
               <a:pPr>
                 <a:defRPr/>
               </a:pPr>
-              <a:t>ו'/אב/תשפ"ג</a:t>
+              <a:t>כ"ד/אב/תשפ"ג</a:t>
             </a:fld>
             <a:endParaRPr lang="he-IL"/>
           </a:p>
@@ -13203,7 +13211,7 @@
               <a:pPr>
                 <a:defRPr/>
               </a:pPr>
-              <a:t>ו'/אב/תשפ"ג</a:t>
+              <a:t>כ"ד/אב/תשפ"ג</a:t>
             </a:fld>
             <a:endParaRPr lang="he-IL"/>
           </a:p>
@@ -13320,7 +13328,7 @@
               <a:pPr>
                 <a:defRPr/>
               </a:pPr>
-              <a:t>ו'/אב/תשפ"ג</a:t>
+              <a:t>כ"ד/אב/תשפ"ג</a:t>
             </a:fld>
             <a:endParaRPr lang="he-IL"/>
           </a:p>
@@ -13617,7 +13625,7 @@
               <a:pPr>
                 <a:defRPr/>
               </a:pPr>
-              <a:t>ו'/אב/תשפ"ג</a:t>
+              <a:t>כ"ד/אב/תשפ"ג</a:t>
             </a:fld>
             <a:endParaRPr lang="he-IL"/>
           </a:p>
@@ -13894,7 +13902,7 @@
               <a:pPr>
                 <a:defRPr/>
               </a:pPr>
-              <a:t>ו'/אב/תשפ"ג</a:t>
+              <a:t>כ"ד/אב/תשפ"ג</a:t>
             </a:fld>
             <a:endParaRPr lang="he-IL"/>
           </a:p>
@@ -14179,7 +14187,7 @@
               <a:pPr>
                 <a:defRPr/>
               </a:pPr>
-              <a:t>ו'/אב/תשפ"ג</a:t>
+              <a:t>כ"ד/אב/תשפ"ג</a:t>
             </a:fld>
             <a:endParaRPr lang="he-IL"/>
           </a:p>
@@ -14739,7 +14747,7 @@
           <a:noFill/>
           <a:extLst>
             <a:ext uri="{909E8E84-426E-40dd-AFC4-6F175D3DCCD1}">
-              <a14:hiddenFill xmlns="" xmlns:a14="http://schemas.microsoft.com/office/drawing/2010/main">
+              <a14:hiddenFill xmlns:a14="http://schemas.microsoft.com/office/drawing/2010/main" xmlns="">
                 <a:solidFill>
                   <a:srgbClr val="FFFFFF"/>
                 </a:solidFill>
@@ -14813,7 +14821,7 @@
               </a:ln>
               <a:extLst>
                 <a:ext uri="{91240B29-F687-4f45-9708-019B960494DF}">
-                  <a14:hiddenLine xmlns="" xmlns:a14="http://schemas.microsoft.com/office/drawing/2010/main" w="9525">
+                  <a14:hiddenLine xmlns:a14="http://schemas.microsoft.com/office/drawing/2010/main" xmlns="" w="9525">
                     <a:solidFill>
                       <a:srgbClr val="000000"/>
                     </a:solidFill>
@@ -14903,7 +14911,7 @@
               </a:ln>
               <a:extLst>
                 <a:ext uri="{91240B29-F687-4f45-9708-019B960494DF}">
-                  <a14:hiddenLine xmlns="" xmlns:a14="http://schemas.microsoft.com/office/drawing/2010/main" w="9525">
+                  <a14:hiddenLine xmlns:a14="http://schemas.microsoft.com/office/drawing/2010/main" xmlns="" w="9525">
                     <a:solidFill>
                       <a:srgbClr val="000000"/>
                     </a:solidFill>
@@ -14993,7 +15001,7 @@
               </a:ln>
               <a:extLst>
                 <a:ext uri="{91240B29-F687-4f45-9708-019B960494DF}">
-                  <a14:hiddenLine xmlns="" xmlns:a14="http://schemas.microsoft.com/office/drawing/2010/main" w="9525">
+                  <a14:hiddenLine xmlns:a14="http://schemas.microsoft.com/office/drawing/2010/main" xmlns="" w="9525">
                     <a:solidFill>
                       <a:srgbClr val="000000"/>
                     </a:solidFill>
@@ -15055,7 +15063,7 @@
               </a:ln>
               <a:extLst>
                 <a:ext uri="{91240B29-F687-4f45-9708-019B960494DF}">
-                  <a14:hiddenLine xmlns="" xmlns:a14="http://schemas.microsoft.com/office/drawing/2010/main" w="9525">
+                  <a14:hiddenLine xmlns:a14="http://schemas.microsoft.com/office/drawing/2010/main" xmlns="" w="9525">
                     <a:solidFill>
                       <a:srgbClr val="000000"/>
                     </a:solidFill>
@@ -15145,7 +15153,7 @@
               </a:ln>
               <a:extLst>
                 <a:ext uri="{91240B29-F687-4f45-9708-019B960494DF}">
-                  <a14:hiddenLine xmlns="" xmlns:a14="http://schemas.microsoft.com/office/drawing/2010/main" w="9525">
+                  <a14:hiddenLine xmlns:a14="http://schemas.microsoft.com/office/drawing/2010/main" xmlns="" w="9525">
                     <a:solidFill>
                       <a:srgbClr val="000000"/>
                     </a:solidFill>
@@ -15207,7 +15215,7 @@
               </a:ln>
               <a:extLst>
                 <a:ext uri="{91240B29-F687-4f45-9708-019B960494DF}">
-                  <a14:hiddenLine xmlns="" xmlns:a14="http://schemas.microsoft.com/office/drawing/2010/main" w="9525">
+                  <a14:hiddenLine xmlns:a14="http://schemas.microsoft.com/office/drawing/2010/main" xmlns="" w="9525">
                     <a:solidFill>
                       <a:srgbClr val="000000"/>
                     </a:solidFill>
@@ -15269,7 +15277,7 @@
               </a:ln>
               <a:extLst>
                 <a:ext uri="{91240B29-F687-4f45-9708-019B960494DF}">
-                  <a14:hiddenLine xmlns="" xmlns:a14="http://schemas.microsoft.com/office/drawing/2010/main" w="9525">
+                  <a14:hiddenLine xmlns:a14="http://schemas.microsoft.com/office/drawing/2010/main" xmlns="" w="9525">
                     <a:solidFill>
                       <a:srgbClr val="000000"/>
                     </a:solidFill>
@@ -15359,7 +15367,7 @@
               </a:ln>
               <a:extLst>
                 <a:ext uri="{91240B29-F687-4f45-9708-019B960494DF}">
-                  <a14:hiddenLine xmlns="" xmlns:a14="http://schemas.microsoft.com/office/drawing/2010/main" w="9525">
+                  <a14:hiddenLine xmlns:a14="http://schemas.microsoft.com/office/drawing/2010/main" xmlns="" w="9525">
                     <a:solidFill>
                       <a:srgbClr val="000000"/>
                     </a:solidFill>
@@ -15449,7 +15457,7 @@
               </a:ln>
               <a:extLst>
                 <a:ext uri="{91240B29-F687-4f45-9708-019B960494DF}">
-                  <a14:hiddenLine xmlns="" xmlns:a14="http://schemas.microsoft.com/office/drawing/2010/main" w="9525">
+                  <a14:hiddenLine xmlns:a14="http://schemas.microsoft.com/office/drawing/2010/main" xmlns="" w="9525">
                     <a:solidFill>
                       <a:srgbClr val="000000"/>
                     </a:solidFill>
@@ -15511,7 +15519,7 @@
               </a:ln>
               <a:extLst>
                 <a:ext uri="{91240B29-F687-4f45-9708-019B960494DF}">
-                  <a14:hiddenLine xmlns="" xmlns:a14="http://schemas.microsoft.com/office/drawing/2010/main" w="9525">
+                  <a14:hiddenLine xmlns:a14="http://schemas.microsoft.com/office/drawing/2010/main" xmlns="" w="9525">
                     <a:solidFill>
                       <a:srgbClr val="000000"/>
                     </a:solidFill>
@@ -15621,7 +15629,7 @@
               </a:ln>
               <a:extLst>
                 <a:ext uri="{91240B29-F687-4f45-9708-019B960494DF}">
-                  <a14:hiddenLine xmlns="" xmlns:a14="http://schemas.microsoft.com/office/drawing/2010/main" w="9525">
+                  <a14:hiddenLine xmlns:a14="http://schemas.microsoft.com/office/drawing/2010/main" xmlns="" w="9525">
                     <a:solidFill>
                       <a:srgbClr val="000000"/>
                     </a:solidFill>
@@ -15705,7 +15713,7 @@
               </a:ln>
               <a:extLst>
                 <a:ext uri="{91240B29-F687-4f45-9708-019B960494DF}">
-                  <a14:hiddenLine xmlns="" xmlns:a14="http://schemas.microsoft.com/office/drawing/2010/main" w="9525">
+                  <a14:hiddenLine xmlns:a14="http://schemas.microsoft.com/office/drawing/2010/main" xmlns="" w="9525">
                     <a:solidFill>
                       <a:srgbClr val="000000"/>
                     </a:solidFill>
@@ -15767,7 +15775,7 @@
               </a:ln>
               <a:extLst>
                 <a:ext uri="{91240B29-F687-4f45-9708-019B960494DF}">
-                  <a14:hiddenLine xmlns="" xmlns:a14="http://schemas.microsoft.com/office/drawing/2010/main" w="9525">
+                  <a14:hiddenLine xmlns:a14="http://schemas.microsoft.com/office/drawing/2010/main" xmlns="" w="9525">
                     <a:solidFill>
                       <a:srgbClr val="000000"/>
                     </a:solidFill>
@@ -15829,7 +15837,7 @@
               </a:ln>
               <a:extLst>
                 <a:ext uri="{91240B29-F687-4f45-9708-019B960494DF}">
-                  <a14:hiddenLine xmlns="" xmlns:a14="http://schemas.microsoft.com/office/drawing/2010/main" w="9525">
+                  <a14:hiddenLine xmlns:a14="http://schemas.microsoft.com/office/drawing/2010/main" xmlns="" w="9525">
                     <a:solidFill>
                       <a:srgbClr val="000000"/>
                     </a:solidFill>
@@ -15919,7 +15927,7 @@
               </a:ln>
               <a:extLst>
                 <a:ext uri="{91240B29-F687-4f45-9708-019B960494DF}">
-                  <a14:hiddenLine xmlns="" xmlns:a14="http://schemas.microsoft.com/office/drawing/2010/main" w="9525">
+                  <a14:hiddenLine xmlns:a14="http://schemas.microsoft.com/office/drawing/2010/main" xmlns="" w="9525">
                     <a:solidFill>
                       <a:srgbClr val="000000"/>
                     </a:solidFill>
@@ -15953,7 +15961,7 @@
               </a:ln>
               <a:extLst>
                 <a:ext uri="{91240B29-F687-4f45-9708-019B960494DF}">
-                  <a14:hiddenLine xmlns="" xmlns:a14="http://schemas.microsoft.com/office/drawing/2010/main" w="9525">
+                  <a14:hiddenLine xmlns:a14="http://schemas.microsoft.com/office/drawing/2010/main" xmlns="" w="9525">
                     <a:solidFill>
                       <a:srgbClr val="000000"/>
                     </a:solidFill>
@@ -16018,7 +16026,7 @@
               </a:ln>
               <a:extLst>
                 <a:ext uri="{91240B29-F687-4f45-9708-019B960494DF}">
-                  <a14:hiddenLine xmlns="" xmlns:a14="http://schemas.microsoft.com/office/drawing/2010/main" w="9525">
+                  <a14:hiddenLine xmlns:a14="http://schemas.microsoft.com/office/drawing/2010/main" xmlns="" w="9525">
                     <a:solidFill>
                       <a:srgbClr val="000000"/>
                     </a:solidFill>
@@ -16108,7 +16116,7 @@
               </a:ln>
               <a:extLst>
                 <a:ext uri="{91240B29-F687-4f45-9708-019B960494DF}">
-                  <a14:hiddenLine xmlns="" xmlns:a14="http://schemas.microsoft.com/office/drawing/2010/main" w="9525">
+                  <a14:hiddenLine xmlns:a14="http://schemas.microsoft.com/office/drawing/2010/main" xmlns="" w="9525">
                     <a:solidFill>
                       <a:srgbClr val="000000"/>
                     </a:solidFill>
@@ -16170,7 +16178,7 @@
               </a:ln>
               <a:extLst>
                 <a:ext uri="{91240B29-F687-4f45-9708-019B960494DF}">
-                  <a14:hiddenLine xmlns="" xmlns:a14="http://schemas.microsoft.com/office/drawing/2010/main" w="9525">
+                  <a14:hiddenLine xmlns:a14="http://schemas.microsoft.com/office/drawing/2010/main" xmlns="" w="9525">
                     <a:solidFill>
                       <a:srgbClr val="000000"/>
                     </a:solidFill>
@@ -16260,7 +16268,7 @@
               </a:ln>
               <a:extLst>
                 <a:ext uri="{91240B29-F687-4f45-9708-019B960494DF}">
-                  <a14:hiddenLine xmlns="" xmlns:a14="http://schemas.microsoft.com/office/drawing/2010/main" w="9525">
+                  <a14:hiddenLine xmlns:a14="http://schemas.microsoft.com/office/drawing/2010/main" xmlns="" w="9525">
                     <a:solidFill>
                       <a:srgbClr val="000000"/>
                     </a:solidFill>
@@ -16325,7 +16333,7 @@
               </a:ln>
               <a:extLst>
                 <a:ext uri="{91240B29-F687-4f45-9708-019B960494DF}">
-                  <a14:hiddenLine xmlns="" xmlns:a14="http://schemas.microsoft.com/office/drawing/2010/main" w="9525">
+                  <a14:hiddenLine xmlns:a14="http://schemas.microsoft.com/office/drawing/2010/main" xmlns="" w="9525">
                     <a:solidFill>
                       <a:srgbClr val="000000"/>
                     </a:solidFill>
@@ -16387,7 +16395,7 @@
               </a:ln>
               <a:extLst>
                 <a:ext uri="{91240B29-F687-4f45-9708-019B960494DF}">
-                  <a14:hiddenLine xmlns="" xmlns:a14="http://schemas.microsoft.com/office/drawing/2010/main" w="9525">
+                  <a14:hiddenLine xmlns:a14="http://schemas.microsoft.com/office/drawing/2010/main" xmlns="" w="9525">
                     <a:solidFill>
                       <a:srgbClr val="000000"/>
                     </a:solidFill>
@@ -16477,7 +16485,7 @@
               </a:ln>
               <a:extLst>
                 <a:ext uri="{91240B29-F687-4f45-9708-019B960494DF}">
-                  <a14:hiddenLine xmlns="" xmlns:a14="http://schemas.microsoft.com/office/drawing/2010/main" w="9525">
+                  <a14:hiddenLine xmlns:a14="http://schemas.microsoft.com/office/drawing/2010/main" xmlns="" w="9525">
                     <a:solidFill>
                       <a:srgbClr val="000000"/>
                     </a:solidFill>
@@ -16567,7 +16575,7 @@
               </a:ln>
               <a:extLst>
                 <a:ext uri="{91240B29-F687-4f45-9708-019B960494DF}">
-                  <a14:hiddenLine xmlns="" xmlns:a14="http://schemas.microsoft.com/office/drawing/2010/main" w="9525">
+                  <a14:hiddenLine xmlns:a14="http://schemas.microsoft.com/office/drawing/2010/main" xmlns="" w="9525">
                     <a:solidFill>
                       <a:srgbClr val="000000"/>
                     </a:solidFill>
@@ -16632,7 +16640,7 @@
               </a:ln>
               <a:extLst>
                 <a:ext uri="{91240B29-F687-4f45-9708-019B960494DF}">
-                  <a14:hiddenLine xmlns="" xmlns:a14="http://schemas.microsoft.com/office/drawing/2010/main" w="9525">
+                  <a14:hiddenLine xmlns:a14="http://schemas.microsoft.com/office/drawing/2010/main" xmlns="" w="9525">
                     <a:solidFill>
                       <a:srgbClr val="000000"/>
                     </a:solidFill>
@@ -16752,7 +16760,7 @@
               </a:ln>
               <a:extLst>
                 <a:ext uri="{91240B29-F687-4f45-9708-019B960494DF}">
-                  <a14:hiddenLine xmlns="" xmlns:a14="http://schemas.microsoft.com/office/drawing/2010/main" w="9525">
+                  <a14:hiddenLine xmlns:a14="http://schemas.microsoft.com/office/drawing/2010/main" xmlns="" w="9525">
                     <a:solidFill>
                       <a:srgbClr val="000000"/>
                     </a:solidFill>
@@ -16833,7 +16841,7 @@
               </a:ln>
               <a:extLst>
                 <a:ext uri="{91240B29-F687-4f45-9708-019B960494DF}">
-                  <a14:hiddenLine xmlns="" xmlns:a14="http://schemas.microsoft.com/office/drawing/2010/main" w="9525">
+                  <a14:hiddenLine xmlns:a14="http://schemas.microsoft.com/office/drawing/2010/main" xmlns="" w="9525">
                     <a:solidFill>
                       <a:srgbClr val="000000"/>
                     </a:solidFill>
@@ -16948,7 +16956,7 @@
               </a:ln>
               <a:extLst>
                 <a:ext uri="{91240B29-F687-4f45-9708-019B960494DF}">
-                  <a14:hiddenLine xmlns="" xmlns:a14="http://schemas.microsoft.com/office/drawing/2010/main" w="9525">
+                  <a14:hiddenLine xmlns:a14="http://schemas.microsoft.com/office/drawing/2010/main" xmlns="" w="9525">
                     <a:solidFill>
                       <a:srgbClr val="000000"/>
                     </a:solidFill>
@@ -17038,7 +17046,7 @@
               </a:ln>
               <a:extLst>
                 <a:ext uri="{91240B29-F687-4f45-9708-019B960494DF}">
-                  <a14:hiddenLine xmlns="" xmlns:a14="http://schemas.microsoft.com/office/drawing/2010/main" w="9525">
+                  <a14:hiddenLine xmlns:a14="http://schemas.microsoft.com/office/drawing/2010/main" xmlns="" w="9525">
                     <a:solidFill>
                       <a:srgbClr val="000000"/>
                     </a:solidFill>
@@ -17103,7 +17111,7 @@
               </a:ln>
               <a:extLst>
                 <a:ext uri="{91240B29-F687-4f45-9708-019B960494DF}">
-                  <a14:hiddenLine xmlns="" xmlns:a14="http://schemas.microsoft.com/office/drawing/2010/main" w="9525">
+                  <a14:hiddenLine xmlns:a14="http://schemas.microsoft.com/office/drawing/2010/main" xmlns="" w="9525">
                     <a:solidFill>
                       <a:srgbClr val="000000"/>
                     </a:solidFill>
@@ -17193,7 +17201,7 @@
               </a:ln>
               <a:extLst>
                 <a:ext uri="{91240B29-F687-4f45-9708-019B960494DF}">
-                  <a14:hiddenLine xmlns="" xmlns:a14="http://schemas.microsoft.com/office/drawing/2010/main" w="9525">
+                  <a14:hiddenLine xmlns:a14="http://schemas.microsoft.com/office/drawing/2010/main" xmlns="" w="9525">
                     <a:solidFill>
                       <a:srgbClr val="000000"/>
                     </a:solidFill>
@@ -17261,7 +17269,7 @@
               </a:ln>
               <a:extLst>
                 <a:ext uri="{91240B29-F687-4f45-9708-019B960494DF}">
-                  <a14:hiddenLine xmlns="" xmlns:a14="http://schemas.microsoft.com/office/drawing/2010/main" w="9525">
+                  <a14:hiddenLine xmlns:a14="http://schemas.microsoft.com/office/drawing/2010/main" xmlns="" w="9525">
                     <a:solidFill>
                       <a:srgbClr val="000000"/>
                     </a:solidFill>
@@ -17351,7 +17359,7 @@
               </a:ln>
               <a:extLst>
                 <a:ext uri="{91240B29-F687-4f45-9708-019B960494DF}">
-                  <a14:hiddenLine xmlns="" xmlns:a14="http://schemas.microsoft.com/office/drawing/2010/main" w="9525">
+                  <a14:hiddenLine xmlns:a14="http://schemas.microsoft.com/office/drawing/2010/main" xmlns="" w="9525">
                     <a:solidFill>
                       <a:srgbClr val="000000"/>
                     </a:solidFill>
@@ -17419,7 +17427,7 @@
               </a:ln>
               <a:extLst>
                 <a:ext uri="{91240B29-F687-4f45-9708-019B960494DF}">
-                  <a14:hiddenLine xmlns="" xmlns:a14="http://schemas.microsoft.com/office/drawing/2010/main" w="9525">
+                  <a14:hiddenLine xmlns:a14="http://schemas.microsoft.com/office/drawing/2010/main" xmlns="" w="9525">
                     <a:solidFill>
                       <a:srgbClr val="000000"/>
                     </a:solidFill>
@@ -17509,7 +17517,7 @@
               </a:ln>
               <a:extLst>
                 <a:ext uri="{91240B29-F687-4f45-9708-019B960494DF}">
-                  <a14:hiddenLine xmlns="" xmlns:a14="http://schemas.microsoft.com/office/drawing/2010/main" w="9525">
+                  <a14:hiddenLine xmlns:a14="http://schemas.microsoft.com/office/drawing/2010/main" xmlns="" w="9525">
                     <a:solidFill>
                       <a:srgbClr val="000000"/>
                     </a:solidFill>
@@ -17543,7 +17551,7 @@
               </a:ln>
               <a:extLst>
                 <a:ext uri="{91240B29-F687-4f45-9708-019B960494DF}">
-                  <a14:hiddenLine xmlns="" xmlns:a14="http://schemas.microsoft.com/office/drawing/2010/main" w="9525">
+                  <a14:hiddenLine xmlns:a14="http://schemas.microsoft.com/office/drawing/2010/main" xmlns="" w="9525">
                     <a:solidFill>
                       <a:srgbClr val="000000"/>
                     </a:solidFill>
@@ -17689,7 +17697,7 @@
               <a:pPr>
                 <a:defRPr/>
               </a:pPr>
-              <a:t>ו'/אב/תשפ"ג</a:t>
+              <a:t>כ"ד/אב/תשפ"ג</a:t>
             </a:fld>
             <a:endParaRPr lang="he-IL"/>
           </a:p>
@@ -25043,13 +25051,18 @@
           <a:lstStyle/>
           <a:p>
             <a:r>
-              <a:rPr lang="he-IL" sz="4900" b="1" dirty="0">
+              <a:rPr lang="he-IL" sz="4900" b="1">
                 <a:solidFill>
                   <a:schemeClr val="bg1"/>
                 </a:solidFill>
               </a:rPr>
-              <a:t>231201</a:t>
+              <a:t>231202</a:t>
             </a:r>
+            <a:endParaRPr lang="he-IL" sz="4900" b="1" dirty="0">
+              <a:solidFill>
+                <a:schemeClr val="bg1"/>
+              </a:solidFill>
+            </a:endParaRPr>
           </a:p>
         </p:txBody>
       </p:sp>

</xml_diff>

<commit_message>
Angle bug fixed. (#47)
Adding new poster version.
</commit_message>
<xml_diff>
--- a/Resources/poster_v_0_0_3.pptx
+++ b/Resources/poster_v_0_0_3.pptx
@@ -1719,16 +1719,24 @@
   <pc:docChgLst>
     <pc:chgData name="Amir Kirshenzvige" userId="fbaaffd5-9cb7-4c06-8e4b-7fc21054e3b2" providerId="ADAL" clId="{1ABA3F46-DA6A-4CD5-AF76-581ECD79F8EC}"/>
     <pc:docChg chg="modSld">
-      <pc:chgData name="Amir Kirshenzvige" userId="fbaaffd5-9cb7-4c06-8e4b-7fc21054e3b2" providerId="ADAL" clId="{1ABA3F46-DA6A-4CD5-AF76-581ECD79F8EC}" dt="2023-07-24T14:36:25.475" v="7" actId="20577"/>
+      <pc:chgData name="Amir Kirshenzvige" userId="fbaaffd5-9cb7-4c06-8e4b-7fc21054e3b2" providerId="ADAL" clId="{1ABA3F46-DA6A-4CD5-AF76-581ECD79F8EC}" dt="2023-08-11T08:12:20.550" v="8" actId="20577"/>
       <pc:docMkLst>
         <pc:docMk/>
       </pc:docMkLst>
       <pc:sldChg chg="modSp mod">
-        <pc:chgData name="Amir Kirshenzvige" userId="fbaaffd5-9cb7-4c06-8e4b-7fc21054e3b2" providerId="ADAL" clId="{1ABA3F46-DA6A-4CD5-AF76-581ECD79F8EC}" dt="2023-07-24T14:36:25.475" v="7" actId="20577"/>
+        <pc:chgData name="Amir Kirshenzvige" userId="fbaaffd5-9cb7-4c06-8e4b-7fc21054e3b2" providerId="ADAL" clId="{1ABA3F46-DA6A-4CD5-AF76-581ECD79F8EC}" dt="2023-08-11T08:12:20.550" v="8" actId="20577"/>
         <pc:sldMkLst>
           <pc:docMk/>
           <pc:sldMk cId="0" sldId="256"/>
         </pc:sldMkLst>
+        <pc:spChg chg="mod">
+          <ac:chgData name="Amir Kirshenzvige" userId="fbaaffd5-9cb7-4c06-8e4b-7fc21054e3b2" providerId="ADAL" clId="{1ABA3F46-DA6A-4CD5-AF76-581ECD79F8EC}" dt="2023-08-11T08:12:20.550" v="8" actId="20577"/>
+          <ac:spMkLst>
+            <pc:docMk/>
+            <pc:sldMk cId="0" sldId="256"/>
+            <ac:spMk id="90" creationId="{53421EA4-8E37-9CEB-515C-B2C0D3959D7F}"/>
+          </ac:spMkLst>
+        </pc:spChg>
         <pc:spChg chg="mod">
           <ac:chgData name="Amir Kirshenzvige" userId="fbaaffd5-9cb7-4c06-8e4b-7fc21054e3b2" providerId="ADAL" clId="{1ABA3F46-DA6A-4CD5-AF76-581ECD79F8EC}" dt="2023-07-24T14:36:25.475" v="7" actId="20577"/>
           <ac:spMkLst>
@@ -1843,7 +1851,7 @@
               <a:pPr>
                 <a:defRPr/>
               </a:pPr>
-              <a:t>ו'/אב/תשפ"ג</a:t>
+              <a:t>כ"ד/אב/תשפ"ג</a:t>
             </a:fld>
             <a:endParaRPr lang="he-IL"/>
           </a:p>
@@ -2019,7 +2027,7 @@
           <a:p>
             <a:fld id="{5EA46A1A-7B25-476C-AFF8-F34B15990641}" type="datetimeFigureOut">
               <a:rPr lang="en-US" smtClean="0"/>
-              <a:t>7/24/2023</a:t>
+              <a:t>8/11/2023</a:t>
             </a:fld>
             <a:endParaRPr lang="en-US"/>
           </a:p>
@@ -2564,7 +2572,7 @@
               <a:pPr>
                 <a:defRPr/>
               </a:pPr>
-              <a:t>ו'/אב/תשפ"ג</a:t>
+              <a:t>כ"ד/אב/תשפ"ג</a:t>
             </a:fld>
             <a:endParaRPr lang="he-IL"/>
           </a:p>
@@ -2754,7 +2762,7 @@
               <a:pPr>
                 <a:defRPr/>
               </a:pPr>
-              <a:t>ו'/אב/תשפ"ג</a:t>
+              <a:t>כ"ד/אב/תשפ"ג</a:t>
             </a:fld>
             <a:endParaRPr lang="he-IL"/>
           </a:p>
@@ -2954,7 +2962,7 @@
               <a:pPr>
                 <a:defRPr/>
               </a:pPr>
-              <a:t>ו'/אב/תשפ"ג</a:t>
+              <a:t>כ"ד/אב/תשפ"ג</a:t>
             </a:fld>
             <a:endParaRPr lang="he-IL"/>
           </a:p>
@@ -3084,7 +3092,7 @@
           <a:noFill/>
           <a:extLst>
             <a:ext uri="{909E8E84-426E-40dd-AFC4-6F175D3DCCD1}">
-              <a14:hiddenFill xmlns="" xmlns:a14="http://schemas.microsoft.com/office/drawing/2010/main">
+              <a14:hiddenFill xmlns:a14="http://schemas.microsoft.com/office/drawing/2010/main" xmlns="">
                 <a:solidFill>
                   <a:srgbClr val="FFFFFF"/>
                 </a:solidFill>
@@ -3143,7 +3151,7 @@
             </a:ln>
             <a:extLst>
               <a:ext uri="{91240B29-F687-4f45-9708-019B960494DF}">
-                <a14:hiddenLine xmlns="" xmlns:a14="http://schemas.microsoft.com/office/drawing/2010/main" w="9525">
+                <a14:hiddenLine xmlns:a14="http://schemas.microsoft.com/office/drawing/2010/main" xmlns="" w="9525">
                   <a:solidFill>
                     <a:srgbClr val="000000"/>
                   </a:solidFill>
@@ -3233,7 +3241,7 @@
             </a:ln>
             <a:extLst>
               <a:ext uri="{91240B29-F687-4f45-9708-019B960494DF}">
-                <a14:hiddenLine xmlns="" xmlns:a14="http://schemas.microsoft.com/office/drawing/2010/main" w="9525">
+                <a14:hiddenLine xmlns:a14="http://schemas.microsoft.com/office/drawing/2010/main" xmlns="" w="9525">
                   <a:solidFill>
                     <a:srgbClr val="000000"/>
                   </a:solidFill>
@@ -3323,7 +3331,7 @@
             </a:ln>
             <a:extLst>
               <a:ext uri="{91240B29-F687-4f45-9708-019B960494DF}">
-                <a14:hiddenLine xmlns="" xmlns:a14="http://schemas.microsoft.com/office/drawing/2010/main" w="9525">
+                <a14:hiddenLine xmlns:a14="http://schemas.microsoft.com/office/drawing/2010/main" xmlns="" w="9525">
                   <a:solidFill>
                     <a:srgbClr val="000000"/>
                   </a:solidFill>
@@ -3357,7 +3365,7 @@
             </a:ln>
             <a:extLst>
               <a:ext uri="{91240B29-F687-4f45-9708-019B960494DF}">
-                <a14:hiddenLine xmlns="" xmlns:a14="http://schemas.microsoft.com/office/drawing/2010/main" w="9525">
+                <a14:hiddenLine xmlns:a14="http://schemas.microsoft.com/office/drawing/2010/main" xmlns="" w="9525">
                   <a:solidFill>
                     <a:srgbClr val="000000"/>
                   </a:solidFill>
@@ -3447,7 +3455,7 @@
             </a:ln>
             <a:extLst>
               <a:ext uri="{91240B29-F687-4f45-9708-019B960494DF}">
-                <a14:hiddenLine xmlns="" xmlns:a14="http://schemas.microsoft.com/office/drawing/2010/main" w="9525">
+                <a14:hiddenLine xmlns:a14="http://schemas.microsoft.com/office/drawing/2010/main" xmlns="" w="9525">
                   <a:solidFill>
                     <a:srgbClr val="000000"/>
                   </a:solidFill>
@@ -3509,7 +3517,7 @@
             </a:ln>
             <a:extLst>
               <a:ext uri="{91240B29-F687-4f45-9708-019B960494DF}">
-                <a14:hiddenLine xmlns="" xmlns:a14="http://schemas.microsoft.com/office/drawing/2010/main" w="9525">
+                <a14:hiddenLine xmlns:a14="http://schemas.microsoft.com/office/drawing/2010/main" xmlns="" w="9525">
                   <a:solidFill>
                     <a:srgbClr val="000000"/>
                   </a:solidFill>
@@ -3571,7 +3579,7 @@
             </a:ln>
             <a:extLst>
               <a:ext uri="{91240B29-F687-4f45-9708-019B960494DF}">
-                <a14:hiddenLine xmlns="" xmlns:a14="http://schemas.microsoft.com/office/drawing/2010/main" w="9525">
+                <a14:hiddenLine xmlns:a14="http://schemas.microsoft.com/office/drawing/2010/main" xmlns="" w="9525">
                   <a:solidFill>
                     <a:srgbClr val="000000"/>
                   </a:solidFill>
@@ -3661,7 +3669,7 @@
             </a:ln>
             <a:extLst>
               <a:ext uri="{91240B29-F687-4f45-9708-019B960494DF}">
-                <a14:hiddenLine xmlns="" xmlns:a14="http://schemas.microsoft.com/office/drawing/2010/main" w="9525">
+                <a14:hiddenLine xmlns:a14="http://schemas.microsoft.com/office/drawing/2010/main" xmlns="" w="9525">
                   <a:solidFill>
                     <a:srgbClr val="000000"/>
                   </a:solidFill>
@@ -3723,7 +3731,7 @@
             </a:ln>
             <a:extLst>
               <a:ext uri="{91240B29-F687-4f45-9708-019B960494DF}">
-                <a14:hiddenLine xmlns="" xmlns:a14="http://schemas.microsoft.com/office/drawing/2010/main" w="9525">
+                <a14:hiddenLine xmlns:a14="http://schemas.microsoft.com/office/drawing/2010/main" xmlns="" w="9525">
                   <a:solidFill>
                     <a:srgbClr val="000000"/>
                   </a:solidFill>
@@ -3785,7 +3793,7 @@
             </a:ln>
             <a:extLst>
               <a:ext uri="{91240B29-F687-4f45-9708-019B960494DF}">
-                <a14:hiddenLine xmlns="" xmlns:a14="http://schemas.microsoft.com/office/drawing/2010/main" w="9525">
+                <a14:hiddenLine xmlns:a14="http://schemas.microsoft.com/office/drawing/2010/main" xmlns="" w="9525">
                   <a:solidFill>
                     <a:srgbClr val="000000"/>
                   </a:solidFill>
@@ -3875,7 +3883,7 @@
             </a:ln>
             <a:extLst>
               <a:ext uri="{91240B29-F687-4f45-9708-019B960494DF}">
-                <a14:hiddenLine xmlns="" xmlns:a14="http://schemas.microsoft.com/office/drawing/2010/main" w="9525">
+                <a14:hiddenLine xmlns:a14="http://schemas.microsoft.com/office/drawing/2010/main" xmlns="" w="9525">
                   <a:solidFill>
                     <a:srgbClr val="000000"/>
                   </a:solidFill>
@@ -3965,7 +3973,7 @@
             </a:ln>
             <a:extLst>
               <a:ext uri="{91240B29-F687-4f45-9708-019B960494DF}">
-                <a14:hiddenLine xmlns="" xmlns:a14="http://schemas.microsoft.com/office/drawing/2010/main" w="9525">
+                <a14:hiddenLine xmlns:a14="http://schemas.microsoft.com/office/drawing/2010/main" xmlns="" w="9525">
                   <a:solidFill>
                     <a:srgbClr val="000000"/>
                   </a:solidFill>
@@ -4027,7 +4035,7 @@
             </a:ln>
             <a:extLst>
               <a:ext uri="{91240B29-F687-4f45-9708-019B960494DF}">
-                <a14:hiddenLine xmlns="" xmlns:a14="http://schemas.microsoft.com/office/drawing/2010/main" w="9525">
+                <a14:hiddenLine xmlns:a14="http://schemas.microsoft.com/office/drawing/2010/main" xmlns="" w="9525">
                   <a:solidFill>
                     <a:srgbClr val="000000"/>
                   </a:solidFill>
@@ -4137,7 +4145,7 @@
             </a:ln>
             <a:extLst>
               <a:ext uri="{91240B29-F687-4f45-9708-019B960494DF}">
-                <a14:hiddenLine xmlns="" xmlns:a14="http://schemas.microsoft.com/office/drawing/2010/main" w="9525">
+                <a14:hiddenLine xmlns:a14="http://schemas.microsoft.com/office/drawing/2010/main" xmlns="" w="9525">
                   <a:solidFill>
                     <a:srgbClr val="000000"/>
                   </a:solidFill>
@@ -4199,7 +4207,7 @@
             </a:ln>
             <a:extLst>
               <a:ext uri="{91240B29-F687-4f45-9708-019B960494DF}">
-                <a14:hiddenLine xmlns="" xmlns:a14="http://schemas.microsoft.com/office/drawing/2010/main" w="9525">
+                <a14:hiddenLine xmlns:a14="http://schemas.microsoft.com/office/drawing/2010/main" xmlns="" w="9525">
                   <a:solidFill>
                     <a:srgbClr val="000000"/>
                   </a:solidFill>
@@ -4289,7 +4297,7 @@
             </a:ln>
             <a:extLst>
               <a:ext uri="{91240B29-F687-4f45-9708-019B960494DF}">
-                <a14:hiddenLine xmlns="" xmlns:a14="http://schemas.microsoft.com/office/drawing/2010/main" w="9525">
+                <a14:hiddenLine xmlns:a14="http://schemas.microsoft.com/office/drawing/2010/main" xmlns="" w="9525">
                   <a:solidFill>
                     <a:srgbClr val="000000"/>
                   </a:solidFill>
@@ -4379,7 +4387,7 @@
             </a:ln>
             <a:extLst>
               <a:ext uri="{91240B29-F687-4f45-9708-019B960494DF}">
-                <a14:hiddenLine xmlns="" xmlns:a14="http://schemas.microsoft.com/office/drawing/2010/main" w="9525">
+                <a14:hiddenLine xmlns:a14="http://schemas.microsoft.com/office/drawing/2010/main" xmlns="" w="9525">
                   <a:solidFill>
                     <a:srgbClr val="000000"/>
                   </a:solidFill>
@@ -4441,7 +4449,7 @@
             </a:ln>
             <a:extLst>
               <a:ext uri="{91240B29-F687-4f45-9708-019B960494DF}">
-                <a14:hiddenLine xmlns="" xmlns:a14="http://schemas.microsoft.com/office/drawing/2010/main" w="9525">
+                <a14:hiddenLine xmlns:a14="http://schemas.microsoft.com/office/drawing/2010/main" xmlns="" w="9525">
                   <a:solidFill>
                     <a:srgbClr val="000000"/>
                   </a:solidFill>
@@ -4531,7 +4539,7 @@
             </a:ln>
             <a:extLst>
               <a:ext uri="{91240B29-F687-4f45-9708-019B960494DF}">
-                <a14:hiddenLine xmlns="" xmlns:a14="http://schemas.microsoft.com/office/drawing/2010/main" w="9525">
+                <a14:hiddenLine xmlns:a14="http://schemas.microsoft.com/office/drawing/2010/main" xmlns="" w="9525">
                   <a:solidFill>
                     <a:srgbClr val="000000"/>
                   </a:solidFill>
@@ -4621,7 +4629,7 @@
             </a:ln>
             <a:extLst>
               <a:ext uri="{91240B29-F687-4f45-9708-019B960494DF}">
-                <a14:hiddenLine xmlns="" xmlns:a14="http://schemas.microsoft.com/office/drawing/2010/main" w="9525">
+                <a14:hiddenLine xmlns:a14="http://schemas.microsoft.com/office/drawing/2010/main" xmlns="" w="9525">
                   <a:solidFill>
                     <a:srgbClr val="000000"/>
                   </a:solidFill>
@@ -4677,7 +4685,7 @@
             </a:ln>
             <a:extLst>
               <a:ext uri="{91240B29-F687-4f45-9708-019B960494DF}">
-                <a14:hiddenLine xmlns="" xmlns:a14="http://schemas.microsoft.com/office/drawing/2010/main" w="9525">
+                <a14:hiddenLine xmlns:a14="http://schemas.microsoft.com/office/drawing/2010/main" xmlns="" w="9525">
                   <a:solidFill>
                     <a:srgbClr val="000000"/>
                   </a:solidFill>
@@ -4767,7 +4775,7 @@
             </a:ln>
             <a:extLst>
               <a:ext uri="{91240B29-F687-4f45-9708-019B960494DF}">
-                <a14:hiddenLine xmlns="" xmlns:a14="http://schemas.microsoft.com/office/drawing/2010/main" w="9525">
+                <a14:hiddenLine xmlns:a14="http://schemas.microsoft.com/office/drawing/2010/main" xmlns="" w="9525">
                   <a:solidFill>
                     <a:srgbClr val="000000"/>
                   </a:solidFill>
@@ -4823,7 +4831,7 @@
             </a:ln>
             <a:extLst>
               <a:ext uri="{91240B29-F687-4f45-9708-019B960494DF}">
-                <a14:hiddenLine xmlns="" xmlns:a14="http://schemas.microsoft.com/office/drawing/2010/main" w="9525">
+                <a14:hiddenLine xmlns:a14="http://schemas.microsoft.com/office/drawing/2010/main" xmlns="" w="9525">
                   <a:solidFill>
                     <a:srgbClr val="000000"/>
                   </a:solidFill>
@@ -4913,7 +4921,7 @@
             </a:ln>
             <a:extLst>
               <a:ext uri="{91240B29-F687-4f45-9708-019B960494DF}">
-                <a14:hiddenLine xmlns="" xmlns:a14="http://schemas.microsoft.com/office/drawing/2010/main" w="9525">
+                <a14:hiddenLine xmlns:a14="http://schemas.microsoft.com/office/drawing/2010/main" xmlns="" w="9525">
                   <a:solidFill>
                     <a:srgbClr val="000000"/>
                   </a:solidFill>
@@ -4981,7 +4989,7 @@
             </a:ln>
             <a:extLst>
               <a:ext uri="{91240B29-F687-4f45-9708-019B960494DF}">
-                <a14:hiddenLine xmlns="" xmlns:a14="http://schemas.microsoft.com/office/drawing/2010/main" w="9525">
+                <a14:hiddenLine xmlns:a14="http://schemas.microsoft.com/office/drawing/2010/main" xmlns="" w="9525">
                   <a:solidFill>
                     <a:srgbClr val="000000"/>
                   </a:solidFill>
@@ -5071,7 +5079,7 @@
             </a:ln>
             <a:extLst>
               <a:ext uri="{91240B29-F687-4f45-9708-019B960494DF}">
-                <a14:hiddenLine xmlns="" xmlns:a14="http://schemas.microsoft.com/office/drawing/2010/main" w="9525">
+                <a14:hiddenLine xmlns:a14="http://schemas.microsoft.com/office/drawing/2010/main" xmlns="" w="9525">
                   <a:solidFill>
                     <a:srgbClr val="000000"/>
                   </a:solidFill>
@@ -5139,7 +5147,7 @@
             </a:ln>
             <a:extLst>
               <a:ext uri="{91240B29-F687-4f45-9708-019B960494DF}">
-                <a14:hiddenLine xmlns="" xmlns:a14="http://schemas.microsoft.com/office/drawing/2010/main" w="9525">
+                <a14:hiddenLine xmlns:a14="http://schemas.microsoft.com/office/drawing/2010/main" xmlns="" w="9525">
                   <a:solidFill>
                     <a:srgbClr val="000000"/>
                   </a:solidFill>
@@ -5229,7 +5237,7 @@
             </a:ln>
             <a:extLst>
               <a:ext uri="{91240B29-F687-4f45-9708-019B960494DF}">
-                <a14:hiddenLine xmlns="" xmlns:a14="http://schemas.microsoft.com/office/drawing/2010/main" w="9525">
+                <a14:hiddenLine xmlns:a14="http://schemas.microsoft.com/office/drawing/2010/main" xmlns="" w="9525">
                   <a:solidFill>
                     <a:srgbClr val="000000"/>
                   </a:solidFill>
@@ -5263,7 +5271,7 @@
             </a:ln>
             <a:extLst>
               <a:ext uri="{91240B29-F687-4f45-9708-019B960494DF}">
-                <a14:hiddenLine xmlns="" xmlns:a14="http://schemas.microsoft.com/office/drawing/2010/main" w="9525">
+                <a14:hiddenLine xmlns:a14="http://schemas.microsoft.com/office/drawing/2010/main" xmlns="" w="9525">
                   <a:solidFill>
                     <a:srgbClr val="000000"/>
                   </a:solidFill>
@@ -5353,7 +5361,7 @@
             </a:ln>
             <a:extLst>
               <a:ext uri="{91240B29-F687-4f45-9708-019B960494DF}">
-                <a14:hiddenLine xmlns="" xmlns:a14="http://schemas.microsoft.com/office/drawing/2010/main" w="9525">
+                <a14:hiddenLine xmlns:a14="http://schemas.microsoft.com/office/drawing/2010/main" xmlns="" w="9525">
                   <a:solidFill>
                     <a:srgbClr val="000000"/>
                   </a:solidFill>
@@ -5415,7 +5423,7 @@
             </a:ln>
             <a:extLst>
               <a:ext uri="{91240B29-F687-4f45-9708-019B960494DF}">
-                <a14:hiddenLine xmlns="" xmlns:a14="http://schemas.microsoft.com/office/drawing/2010/main" w="9525">
+                <a14:hiddenLine xmlns:a14="http://schemas.microsoft.com/office/drawing/2010/main" xmlns="" w="9525">
                   <a:solidFill>
                     <a:srgbClr val="000000"/>
                   </a:solidFill>
@@ -5477,7 +5485,7 @@
             </a:ln>
             <a:extLst>
               <a:ext uri="{91240B29-F687-4f45-9708-019B960494DF}">
-                <a14:hiddenLine xmlns="" xmlns:a14="http://schemas.microsoft.com/office/drawing/2010/main" w="9525">
+                <a14:hiddenLine xmlns:a14="http://schemas.microsoft.com/office/drawing/2010/main" xmlns="" w="9525">
                   <a:solidFill>
                     <a:srgbClr val="000000"/>
                   </a:solidFill>
@@ -5567,7 +5575,7 @@
             </a:ln>
             <a:extLst>
               <a:ext uri="{91240B29-F687-4f45-9708-019B960494DF}">
-                <a14:hiddenLine xmlns="" xmlns:a14="http://schemas.microsoft.com/office/drawing/2010/main" w="9525">
+                <a14:hiddenLine xmlns:a14="http://schemas.microsoft.com/office/drawing/2010/main" xmlns="" w="9525">
                   <a:solidFill>
                     <a:srgbClr val="000000"/>
                   </a:solidFill>
@@ -5635,7 +5643,7 @@
             </a:ln>
             <a:extLst>
               <a:ext uri="{91240B29-F687-4f45-9708-019B960494DF}">
-                <a14:hiddenLine xmlns="" xmlns:a14="http://schemas.microsoft.com/office/drawing/2010/main" w="9525">
+                <a14:hiddenLine xmlns:a14="http://schemas.microsoft.com/office/drawing/2010/main" xmlns="" w="9525">
                   <a:solidFill>
                     <a:srgbClr val="000000"/>
                   </a:solidFill>
@@ -5697,7 +5705,7 @@
             </a:ln>
             <a:extLst>
               <a:ext uri="{91240B29-F687-4f45-9708-019B960494DF}">
-                <a14:hiddenLine xmlns="" xmlns:a14="http://schemas.microsoft.com/office/drawing/2010/main" w="9525">
+                <a14:hiddenLine xmlns:a14="http://schemas.microsoft.com/office/drawing/2010/main" xmlns="" w="9525">
                   <a:solidFill>
                     <a:srgbClr val="000000"/>
                   </a:solidFill>
@@ -5787,7 +5795,7 @@
             </a:ln>
             <a:extLst>
               <a:ext uri="{91240B29-F687-4f45-9708-019B960494DF}">
-                <a14:hiddenLine xmlns="" xmlns:a14="http://schemas.microsoft.com/office/drawing/2010/main" w="9525">
+                <a14:hiddenLine xmlns:a14="http://schemas.microsoft.com/office/drawing/2010/main" xmlns="" w="9525">
                   <a:solidFill>
                     <a:srgbClr val="000000"/>
                   </a:solidFill>
@@ -5849,7 +5857,7 @@
             </a:ln>
             <a:extLst>
               <a:ext uri="{91240B29-F687-4f45-9708-019B960494DF}">
-                <a14:hiddenLine xmlns="" xmlns:a14="http://schemas.microsoft.com/office/drawing/2010/main" w="9525">
+                <a14:hiddenLine xmlns:a14="http://schemas.microsoft.com/office/drawing/2010/main" xmlns="" w="9525">
                   <a:solidFill>
                     <a:srgbClr val="000000"/>
                   </a:solidFill>
@@ -5939,7 +5947,7 @@
             </a:ln>
             <a:extLst>
               <a:ext uri="{91240B29-F687-4f45-9708-019B960494DF}">
-                <a14:hiddenLine xmlns="" xmlns:a14="http://schemas.microsoft.com/office/drawing/2010/main" w="9525">
+                <a14:hiddenLine xmlns:a14="http://schemas.microsoft.com/office/drawing/2010/main" xmlns="" w="9525">
                   <a:solidFill>
                     <a:srgbClr val="000000"/>
                   </a:solidFill>
@@ -6001,7 +6009,7 @@
             </a:ln>
             <a:extLst>
               <a:ext uri="{91240B29-F687-4f45-9708-019B960494DF}">
-                <a14:hiddenLine xmlns="" xmlns:a14="http://schemas.microsoft.com/office/drawing/2010/main" w="9525">
+                <a14:hiddenLine xmlns:a14="http://schemas.microsoft.com/office/drawing/2010/main" xmlns="" w="9525">
                   <a:solidFill>
                     <a:srgbClr val="000000"/>
                   </a:solidFill>
@@ -6091,7 +6099,7 @@
             </a:ln>
             <a:extLst>
               <a:ext uri="{91240B29-F687-4f45-9708-019B960494DF}">
-                <a14:hiddenLine xmlns="" xmlns:a14="http://schemas.microsoft.com/office/drawing/2010/main" w="9525">
+                <a14:hiddenLine xmlns:a14="http://schemas.microsoft.com/office/drawing/2010/main" xmlns="" w="9525">
                   <a:solidFill>
                     <a:srgbClr val="000000"/>
                   </a:solidFill>
@@ -6125,7 +6133,7 @@
             </a:ln>
             <a:extLst>
               <a:ext uri="{91240B29-F687-4f45-9708-019B960494DF}">
-                <a14:hiddenLine xmlns="" xmlns:a14="http://schemas.microsoft.com/office/drawing/2010/main" w="9525">
+                <a14:hiddenLine xmlns:a14="http://schemas.microsoft.com/office/drawing/2010/main" xmlns="" w="9525">
                   <a:solidFill>
                     <a:srgbClr val="000000"/>
                   </a:solidFill>
@@ -6190,7 +6198,7 @@
             </a:ln>
             <a:extLst>
               <a:ext uri="{91240B29-F687-4f45-9708-019B960494DF}">
-                <a14:hiddenLine xmlns="" xmlns:a14="http://schemas.microsoft.com/office/drawing/2010/main" w="9525">
+                <a14:hiddenLine xmlns:a14="http://schemas.microsoft.com/office/drawing/2010/main" xmlns="" w="9525">
                   <a:solidFill>
                     <a:srgbClr val="000000"/>
                   </a:solidFill>
@@ -6280,7 +6288,7 @@
             </a:ln>
             <a:extLst>
               <a:ext uri="{91240B29-F687-4f45-9708-019B960494DF}">
-                <a14:hiddenLine xmlns="" xmlns:a14="http://schemas.microsoft.com/office/drawing/2010/main" w="9525">
+                <a14:hiddenLine xmlns:a14="http://schemas.microsoft.com/office/drawing/2010/main" xmlns="" w="9525">
                   <a:solidFill>
                     <a:srgbClr val="000000"/>
                   </a:solidFill>
@@ -6342,7 +6350,7 @@
             </a:ln>
             <a:extLst>
               <a:ext uri="{91240B29-F687-4f45-9708-019B960494DF}">
-                <a14:hiddenLine xmlns="" xmlns:a14="http://schemas.microsoft.com/office/drawing/2010/main" w="9525">
+                <a14:hiddenLine xmlns:a14="http://schemas.microsoft.com/office/drawing/2010/main" xmlns="" w="9525">
                   <a:solidFill>
                     <a:srgbClr val="000000"/>
                   </a:solidFill>
@@ -6432,7 +6440,7 @@
             </a:ln>
             <a:extLst>
               <a:ext uri="{91240B29-F687-4f45-9708-019B960494DF}">
-                <a14:hiddenLine xmlns="" xmlns:a14="http://schemas.microsoft.com/office/drawing/2010/main" w="9525">
+                <a14:hiddenLine xmlns:a14="http://schemas.microsoft.com/office/drawing/2010/main" xmlns="" w="9525">
                   <a:solidFill>
                     <a:srgbClr val="000000"/>
                   </a:solidFill>
@@ -6522,7 +6530,7 @@
             </a:ln>
             <a:extLst>
               <a:ext uri="{91240B29-F687-4f45-9708-019B960494DF}">
-                <a14:hiddenLine xmlns="" xmlns:a14="http://schemas.microsoft.com/office/drawing/2010/main" w="9525">
+                <a14:hiddenLine xmlns:a14="http://schemas.microsoft.com/office/drawing/2010/main" xmlns="" w="9525">
                   <a:solidFill>
                     <a:srgbClr val="000000"/>
                   </a:solidFill>
@@ -6587,7 +6595,7 @@
             </a:ln>
             <a:extLst>
               <a:ext uri="{91240B29-F687-4f45-9708-019B960494DF}">
-                <a14:hiddenLine xmlns="" xmlns:a14="http://schemas.microsoft.com/office/drawing/2010/main" w="9525">
+                <a14:hiddenLine xmlns:a14="http://schemas.microsoft.com/office/drawing/2010/main" xmlns="" w="9525">
                   <a:solidFill>
                     <a:srgbClr val="000000"/>
                   </a:solidFill>
@@ -6649,7 +6657,7 @@
             </a:ln>
             <a:extLst>
               <a:ext uri="{91240B29-F687-4f45-9708-019B960494DF}">
-                <a14:hiddenLine xmlns="" xmlns:a14="http://schemas.microsoft.com/office/drawing/2010/main" w="9525">
+                <a14:hiddenLine xmlns:a14="http://schemas.microsoft.com/office/drawing/2010/main" xmlns="" w="9525">
                   <a:solidFill>
                     <a:srgbClr val="000000"/>
                   </a:solidFill>
@@ -6739,7 +6747,7 @@
             </a:ln>
             <a:extLst>
               <a:ext uri="{91240B29-F687-4f45-9708-019B960494DF}">
-                <a14:hiddenLine xmlns="" xmlns:a14="http://schemas.microsoft.com/office/drawing/2010/main" w="9525">
+                <a14:hiddenLine xmlns:a14="http://schemas.microsoft.com/office/drawing/2010/main" xmlns="" w="9525">
                   <a:solidFill>
                     <a:srgbClr val="000000"/>
                   </a:solidFill>
@@ -6829,7 +6837,7 @@
             </a:ln>
             <a:extLst>
               <a:ext uri="{91240B29-F687-4f45-9708-019B960494DF}">
-                <a14:hiddenLine xmlns="" xmlns:a14="http://schemas.microsoft.com/office/drawing/2010/main" w="9525">
+                <a14:hiddenLine xmlns:a14="http://schemas.microsoft.com/office/drawing/2010/main" xmlns="" w="9525">
                   <a:solidFill>
                     <a:srgbClr val="000000"/>
                   </a:solidFill>
@@ -6891,7 +6899,7 @@
             </a:ln>
             <a:extLst>
               <a:ext uri="{91240B29-F687-4f45-9708-019B960494DF}">
-                <a14:hiddenLine xmlns="" xmlns:a14="http://schemas.microsoft.com/office/drawing/2010/main" w="9525">
+                <a14:hiddenLine xmlns:a14="http://schemas.microsoft.com/office/drawing/2010/main" xmlns="" w="9525">
                   <a:solidFill>
                     <a:srgbClr val="000000"/>
                   </a:solidFill>
@@ -7011,7 +7019,7 @@
             </a:ln>
             <a:extLst>
               <a:ext uri="{91240B29-F687-4f45-9708-019B960494DF}">
-                <a14:hiddenLine xmlns="" xmlns:a14="http://schemas.microsoft.com/office/drawing/2010/main" w="9525">
+                <a14:hiddenLine xmlns:a14="http://schemas.microsoft.com/office/drawing/2010/main" xmlns="" w="9525">
                   <a:solidFill>
                     <a:srgbClr val="000000"/>
                   </a:solidFill>
@@ -7079,7 +7087,7 @@
             </a:ln>
             <a:extLst>
               <a:ext uri="{91240B29-F687-4f45-9708-019B960494DF}">
-                <a14:hiddenLine xmlns="" xmlns:a14="http://schemas.microsoft.com/office/drawing/2010/main" w="9525">
+                <a14:hiddenLine xmlns:a14="http://schemas.microsoft.com/office/drawing/2010/main" xmlns="" w="9525">
                   <a:solidFill>
                     <a:srgbClr val="000000"/>
                   </a:solidFill>
@@ -7169,7 +7177,7 @@
             </a:ln>
             <a:extLst>
               <a:ext uri="{91240B29-F687-4f45-9708-019B960494DF}">
-                <a14:hiddenLine xmlns="" xmlns:a14="http://schemas.microsoft.com/office/drawing/2010/main" w="9525">
+                <a14:hiddenLine xmlns:a14="http://schemas.microsoft.com/office/drawing/2010/main" xmlns="" w="9525">
                   <a:solidFill>
                     <a:srgbClr val="000000"/>
                   </a:solidFill>
@@ -7315,7 +7323,7 @@
               <a:pPr>
                 <a:defRPr/>
               </a:pPr>
-              <a:t>ו'/אב/תשפ"ג</a:t>
+              <a:t>כ"ד/אב/תשפ"ג</a:t>
             </a:fld>
             <a:endParaRPr lang="he-IL"/>
           </a:p>
@@ -7520,7 +7528,7 @@
               <a:pPr>
                 <a:defRPr/>
               </a:pPr>
-              <a:t>ו'/אב/תשפ"ג</a:t>
+              <a:t>כ"ד/אב/תשפ"ג</a:t>
             </a:fld>
             <a:endParaRPr lang="he-IL"/>
           </a:p>
@@ -7790,7 +7798,7 @@
               <a:pPr>
                 <a:defRPr/>
               </a:pPr>
-              <a:t>ו'/אב/תשפ"ג</a:t>
+              <a:t>כ"ד/אב/תשפ"ג</a:t>
             </a:fld>
             <a:endParaRPr lang="he-IL"/>
           </a:p>
@@ -8032,7 +8040,7 @@
               <a:pPr>
                 <a:defRPr/>
               </a:pPr>
-              <a:t>ו'/אב/תשפ"ג</a:t>
+              <a:t>כ"ד/אב/תשפ"ג</a:t>
             </a:fld>
             <a:endParaRPr lang="he-IL"/>
           </a:p>
@@ -8423,7 +8431,7 @@
               <a:pPr>
                 <a:defRPr/>
               </a:pPr>
-              <a:t>ו'/אב/תשפ"ג</a:t>
+              <a:t>כ"ד/אב/תשפ"ג</a:t>
             </a:fld>
             <a:endParaRPr lang="he-IL"/>
           </a:p>
@@ -8551,7 +8559,7 @@
               <a:pPr>
                 <a:defRPr/>
               </a:pPr>
-              <a:t>ו'/אב/תשפ"ג</a:t>
+              <a:t>כ"ד/אב/תשפ"ג</a:t>
             </a:fld>
             <a:endParaRPr lang="he-IL"/>
           </a:p>
@@ -8656,7 +8664,7 @@
               <a:pPr>
                 <a:defRPr/>
               </a:pPr>
-              <a:t>ו'/אב/תשפ"ג</a:t>
+              <a:t>כ"ד/אב/תשפ"ג</a:t>
             </a:fld>
             <a:endParaRPr lang="he-IL"/>
           </a:p>
@@ -8915,7 +8923,7 @@
               <a:pPr>
                 <a:defRPr/>
               </a:pPr>
-              <a:t>ו'/אב/תשפ"ג</a:t>
+              <a:t>כ"ד/אב/תשפ"ג</a:t>
             </a:fld>
             <a:endParaRPr lang="he-IL"/>
           </a:p>
@@ -9207,7 +9215,7 @@
               <a:pPr>
                 <a:defRPr/>
               </a:pPr>
-              <a:t>ו'/אב/תשפ"ג</a:t>
+              <a:t>כ"ד/אב/תשפ"ג</a:t>
             </a:fld>
             <a:endParaRPr lang="he-IL"/>
           </a:p>
@@ -9474,7 +9482,7 @@
               <a:pPr>
                 <a:defRPr/>
               </a:pPr>
-              <a:t>ו'/אב/תשפ"ג</a:t>
+              <a:t>כ"ד/אב/תשפ"ג</a:t>
             </a:fld>
             <a:endParaRPr lang="he-IL"/>
           </a:p>
@@ -9680,7 +9688,7 @@
               <a:pPr>
                 <a:defRPr/>
               </a:pPr>
-              <a:t>ו'/אב/תשפ"ג</a:t>
+              <a:t>כ"ד/אב/תשפ"ג</a:t>
             </a:fld>
             <a:endParaRPr lang="he-IL"/>
           </a:p>
@@ -9953,7 +9961,7 @@
               <a:pPr>
                 <a:defRPr/>
               </a:pPr>
-              <a:t>ו'/אב/תשפ"ג</a:t>
+              <a:t>כ"ד/אב/תשפ"ג</a:t>
             </a:fld>
             <a:endParaRPr lang="he-IL"/>
           </a:p>
@@ -10397,7 +10405,7 @@
               <a:pPr>
                 <a:defRPr/>
               </a:pPr>
-              <a:t>ו'/אב/תשפ"ג</a:t>
+              <a:t>כ"ד/אב/תשפ"ג</a:t>
             </a:fld>
             <a:endParaRPr lang="he-IL"/>
           </a:p>
@@ -10953,7 +10961,7 @@
               <a:pPr>
                 <a:defRPr/>
               </a:pPr>
-              <a:t>ו'/אב/תשפ"ג</a:t>
+              <a:t>כ"ד/אב/תשפ"ג</a:t>
             </a:fld>
             <a:endParaRPr lang="he-IL"/>
           </a:p>
@@ -11683,7 +11691,7 @@
               <a:pPr>
                 <a:defRPr/>
               </a:pPr>
-              <a:t>ו'/אב/תשפ"ג</a:t>
+              <a:t>כ"ד/אב/תשפ"ג</a:t>
             </a:fld>
             <a:endParaRPr lang="he-IL"/>
           </a:p>
@@ -11867,7 +11875,7 @@
               <a:pPr>
                 <a:defRPr/>
               </a:pPr>
-              <a:t>ו'/אב/תשפ"ג</a:t>
+              <a:t>כ"ד/אב/תשפ"ג</a:t>
             </a:fld>
             <a:endParaRPr lang="he-IL"/>
           </a:p>
@@ -12057,7 +12065,7 @@
               <a:pPr>
                 <a:defRPr/>
               </a:pPr>
-              <a:t>ו'/אב/תשפ"ג</a:t>
+              <a:t>כ"ד/אב/תשפ"ג</a:t>
             </a:fld>
             <a:endParaRPr lang="he-IL"/>
           </a:p>
@@ -12316,7 +12324,7 @@
               <a:pPr>
                 <a:defRPr/>
               </a:pPr>
-              <a:t>ו'/אב/תשפ"ג</a:t>
+              <a:t>כ"ד/אב/תשפ"ג</a:t>
             </a:fld>
             <a:endParaRPr lang="he-IL"/>
           </a:p>
@@ -12623,7 +12631,7 @@
               <a:pPr>
                 <a:defRPr/>
               </a:pPr>
-              <a:t>ו'/אב/תשפ"ג</a:t>
+              <a:t>כ"ד/אב/תשפ"ג</a:t>
             </a:fld>
             <a:endParaRPr lang="he-IL"/>
           </a:p>
@@ -13064,7 +13072,7 @@
               <a:pPr>
                 <a:defRPr/>
               </a:pPr>
-              <a:t>ו'/אב/תשפ"ג</a:t>
+              <a:t>כ"ד/אב/תשפ"ג</a:t>
             </a:fld>
             <a:endParaRPr lang="he-IL"/>
           </a:p>
@@ -13203,7 +13211,7 @@
               <a:pPr>
                 <a:defRPr/>
               </a:pPr>
-              <a:t>ו'/אב/תשפ"ג</a:t>
+              <a:t>כ"ד/אב/תשפ"ג</a:t>
             </a:fld>
             <a:endParaRPr lang="he-IL"/>
           </a:p>
@@ -13320,7 +13328,7 @@
               <a:pPr>
                 <a:defRPr/>
               </a:pPr>
-              <a:t>ו'/אב/תשפ"ג</a:t>
+              <a:t>כ"ד/אב/תשפ"ג</a:t>
             </a:fld>
             <a:endParaRPr lang="he-IL"/>
           </a:p>
@@ -13617,7 +13625,7 @@
               <a:pPr>
                 <a:defRPr/>
               </a:pPr>
-              <a:t>ו'/אב/תשפ"ג</a:t>
+              <a:t>כ"ד/אב/תשפ"ג</a:t>
             </a:fld>
             <a:endParaRPr lang="he-IL"/>
           </a:p>
@@ -13894,7 +13902,7 @@
               <a:pPr>
                 <a:defRPr/>
               </a:pPr>
-              <a:t>ו'/אב/תשפ"ג</a:t>
+              <a:t>כ"ד/אב/תשפ"ג</a:t>
             </a:fld>
             <a:endParaRPr lang="he-IL"/>
           </a:p>
@@ -14179,7 +14187,7 @@
               <a:pPr>
                 <a:defRPr/>
               </a:pPr>
-              <a:t>ו'/אב/תשפ"ג</a:t>
+              <a:t>כ"ד/אב/תשפ"ג</a:t>
             </a:fld>
             <a:endParaRPr lang="he-IL"/>
           </a:p>
@@ -14739,7 +14747,7 @@
           <a:noFill/>
           <a:extLst>
             <a:ext uri="{909E8E84-426E-40dd-AFC4-6F175D3DCCD1}">
-              <a14:hiddenFill xmlns="" xmlns:a14="http://schemas.microsoft.com/office/drawing/2010/main">
+              <a14:hiddenFill xmlns:a14="http://schemas.microsoft.com/office/drawing/2010/main" xmlns="">
                 <a:solidFill>
                   <a:srgbClr val="FFFFFF"/>
                 </a:solidFill>
@@ -14813,7 +14821,7 @@
               </a:ln>
               <a:extLst>
                 <a:ext uri="{91240B29-F687-4f45-9708-019B960494DF}">
-                  <a14:hiddenLine xmlns="" xmlns:a14="http://schemas.microsoft.com/office/drawing/2010/main" w="9525">
+                  <a14:hiddenLine xmlns:a14="http://schemas.microsoft.com/office/drawing/2010/main" xmlns="" w="9525">
                     <a:solidFill>
                       <a:srgbClr val="000000"/>
                     </a:solidFill>
@@ -14903,7 +14911,7 @@
               </a:ln>
               <a:extLst>
                 <a:ext uri="{91240B29-F687-4f45-9708-019B960494DF}">
-                  <a14:hiddenLine xmlns="" xmlns:a14="http://schemas.microsoft.com/office/drawing/2010/main" w="9525">
+                  <a14:hiddenLine xmlns:a14="http://schemas.microsoft.com/office/drawing/2010/main" xmlns="" w="9525">
                     <a:solidFill>
                       <a:srgbClr val="000000"/>
                     </a:solidFill>
@@ -14993,7 +15001,7 @@
               </a:ln>
               <a:extLst>
                 <a:ext uri="{91240B29-F687-4f45-9708-019B960494DF}">
-                  <a14:hiddenLine xmlns="" xmlns:a14="http://schemas.microsoft.com/office/drawing/2010/main" w="9525">
+                  <a14:hiddenLine xmlns:a14="http://schemas.microsoft.com/office/drawing/2010/main" xmlns="" w="9525">
                     <a:solidFill>
                       <a:srgbClr val="000000"/>
                     </a:solidFill>
@@ -15055,7 +15063,7 @@
               </a:ln>
               <a:extLst>
                 <a:ext uri="{91240B29-F687-4f45-9708-019B960494DF}">
-                  <a14:hiddenLine xmlns="" xmlns:a14="http://schemas.microsoft.com/office/drawing/2010/main" w="9525">
+                  <a14:hiddenLine xmlns:a14="http://schemas.microsoft.com/office/drawing/2010/main" xmlns="" w="9525">
                     <a:solidFill>
                       <a:srgbClr val="000000"/>
                     </a:solidFill>
@@ -15145,7 +15153,7 @@
               </a:ln>
               <a:extLst>
                 <a:ext uri="{91240B29-F687-4f45-9708-019B960494DF}">
-                  <a14:hiddenLine xmlns="" xmlns:a14="http://schemas.microsoft.com/office/drawing/2010/main" w="9525">
+                  <a14:hiddenLine xmlns:a14="http://schemas.microsoft.com/office/drawing/2010/main" xmlns="" w="9525">
                     <a:solidFill>
                       <a:srgbClr val="000000"/>
                     </a:solidFill>
@@ -15207,7 +15215,7 @@
               </a:ln>
               <a:extLst>
                 <a:ext uri="{91240B29-F687-4f45-9708-019B960494DF}">
-                  <a14:hiddenLine xmlns="" xmlns:a14="http://schemas.microsoft.com/office/drawing/2010/main" w="9525">
+                  <a14:hiddenLine xmlns:a14="http://schemas.microsoft.com/office/drawing/2010/main" xmlns="" w="9525">
                     <a:solidFill>
                       <a:srgbClr val="000000"/>
                     </a:solidFill>
@@ -15269,7 +15277,7 @@
               </a:ln>
               <a:extLst>
                 <a:ext uri="{91240B29-F687-4f45-9708-019B960494DF}">
-                  <a14:hiddenLine xmlns="" xmlns:a14="http://schemas.microsoft.com/office/drawing/2010/main" w="9525">
+                  <a14:hiddenLine xmlns:a14="http://schemas.microsoft.com/office/drawing/2010/main" xmlns="" w="9525">
                     <a:solidFill>
                       <a:srgbClr val="000000"/>
                     </a:solidFill>
@@ -15359,7 +15367,7 @@
               </a:ln>
               <a:extLst>
                 <a:ext uri="{91240B29-F687-4f45-9708-019B960494DF}">
-                  <a14:hiddenLine xmlns="" xmlns:a14="http://schemas.microsoft.com/office/drawing/2010/main" w="9525">
+                  <a14:hiddenLine xmlns:a14="http://schemas.microsoft.com/office/drawing/2010/main" xmlns="" w="9525">
                     <a:solidFill>
                       <a:srgbClr val="000000"/>
                     </a:solidFill>
@@ -15449,7 +15457,7 @@
               </a:ln>
               <a:extLst>
                 <a:ext uri="{91240B29-F687-4f45-9708-019B960494DF}">
-                  <a14:hiddenLine xmlns="" xmlns:a14="http://schemas.microsoft.com/office/drawing/2010/main" w="9525">
+                  <a14:hiddenLine xmlns:a14="http://schemas.microsoft.com/office/drawing/2010/main" xmlns="" w="9525">
                     <a:solidFill>
                       <a:srgbClr val="000000"/>
                     </a:solidFill>
@@ -15511,7 +15519,7 @@
               </a:ln>
               <a:extLst>
                 <a:ext uri="{91240B29-F687-4f45-9708-019B960494DF}">
-                  <a14:hiddenLine xmlns="" xmlns:a14="http://schemas.microsoft.com/office/drawing/2010/main" w="9525">
+                  <a14:hiddenLine xmlns:a14="http://schemas.microsoft.com/office/drawing/2010/main" xmlns="" w="9525">
                     <a:solidFill>
                       <a:srgbClr val="000000"/>
                     </a:solidFill>
@@ -15621,7 +15629,7 @@
               </a:ln>
               <a:extLst>
                 <a:ext uri="{91240B29-F687-4f45-9708-019B960494DF}">
-                  <a14:hiddenLine xmlns="" xmlns:a14="http://schemas.microsoft.com/office/drawing/2010/main" w="9525">
+                  <a14:hiddenLine xmlns:a14="http://schemas.microsoft.com/office/drawing/2010/main" xmlns="" w="9525">
                     <a:solidFill>
                       <a:srgbClr val="000000"/>
                     </a:solidFill>
@@ -15705,7 +15713,7 @@
               </a:ln>
               <a:extLst>
                 <a:ext uri="{91240B29-F687-4f45-9708-019B960494DF}">
-                  <a14:hiddenLine xmlns="" xmlns:a14="http://schemas.microsoft.com/office/drawing/2010/main" w="9525">
+                  <a14:hiddenLine xmlns:a14="http://schemas.microsoft.com/office/drawing/2010/main" xmlns="" w="9525">
                     <a:solidFill>
                       <a:srgbClr val="000000"/>
                     </a:solidFill>
@@ -15767,7 +15775,7 @@
               </a:ln>
               <a:extLst>
                 <a:ext uri="{91240B29-F687-4f45-9708-019B960494DF}">
-                  <a14:hiddenLine xmlns="" xmlns:a14="http://schemas.microsoft.com/office/drawing/2010/main" w="9525">
+                  <a14:hiddenLine xmlns:a14="http://schemas.microsoft.com/office/drawing/2010/main" xmlns="" w="9525">
                     <a:solidFill>
                       <a:srgbClr val="000000"/>
                     </a:solidFill>
@@ -15829,7 +15837,7 @@
               </a:ln>
               <a:extLst>
                 <a:ext uri="{91240B29-F687-4f45-9708-019B960494DF}">
-                  <a14:hiddenLine xmlns="" xmlns:a14="http://schemas.microsoft.com/office/drawing/2010/main" w="9525">
+                  <a14:hiddenLine xmlns:a14="http://schemas.microsoft.com/office/drawing/2010/main" xmlns="" w="9525">
                     <a:solidFill>
                       <a:srgbClr val="000000"/>
                     </a:solidFill>
@@ -15919,7 +15927,7 @@
               </a:ln>
               <a:extLst>
                 <a:ext uri="{91240B29-F687-4f45-9708-019B960494DF}">
-                  <a14:hiddenLine xmlns="" xmlns:a14="http://schemas.microsoft.com/office/drawing/2010/main" w="9525">
+                  <a14:hiddenLine xmlns:a14="http://schemas.microsoft.com/office/drawing/2010/main" xmlns="" w="9525">
                     <a:solidFill>
                       <a:srgbClr val="000000"/>
                     </a:solidFill>
@@ -15953,7 +15961,7 @@
               </a:ln>
               <a:extLst>
                 <a:ext uri="{91240B29-F687-4f45-9708-019B960494DF}">
-                  <a14:hiddenLine xmlns="" xmlns:a14="http://schemas.microsoft.com/office/drawing/2010/main" w="9525">
+                  <a14:hiddenLine xmlns:a14="http://schemas.microsoft.com/office/drawing/2010/main" xmlns="" w="9525">
                     <a:solidFill>
                       <a:srgbClr val="000000"/>
                     </a:solidFill>
@@ -16018,7 +16026,7 @@
               </a:ln>
               <a:extLst>
                 <a:ext uri="{91240B29-F687-4f45-9708-019B960494DF}">
-                  <a14:hiddenLine xmlns="" xmlns:a14="http://schemas.microsoft.com/office/drawing/2010/main" w="9525">
+                  <a14:hiddenLine xmlns:a14="http://schemas.microsoft.com/office/drawing/2010/main" xmlns="" w="9525">
                     <a:solidFill>
                       <a:srgbClr val="000000"/>
                     </a:solidFill>
@@ -16108,7 +16116,7 @@
               </a:ln>
               <a:extLst>
                 <a:ext uri="{91240B29-F687-4f45-9708-019B960494DF}">
-                  <a14:hiddenLine xmlns="" xmlns:a14="http://schemas.microsoft.com/office/drawing/2010/main" w="9525">
+                  <a14:hiddenLine xmlns:a14="http://schemas.microsoft.com/office/drawing/2010/main" xmlns="" w="9525">
                     <a:solidFill>
                       <a:srgbClr val="000000"/>
                     </a:solidFill>
@@ -16170,7 +16178,7 @@
               </a:ln>
               <a:extLst>
                 <a:ext uri="{91240B29-F687-4f45-9708-019B960494DF}">
-                  <a14:hiddenLine xmlns="" xmlns:a14="http://schemas.microsoft.com/office/drawing/2010/main" w="9525">
+                  <a14:hiddenLine xmlns:a14="http://schemas.microsoft.com/office/drawing/2010/main" xmlns="" w="9525">
                     <a:solidFill>
                       <a:srgbClr val="000000"/>
                     </a:solidFill>
@@ -16260,7 +16268,7 @@
               </a:ln>
               <a:extLst>
                 <a:ext uri="{91240B29-F687-4f45-9708-019B960494DF}">
-                  <a14:hiddenLine xmlns="" xmlns:a14="http://schemas.microsoft.com/office/drawing/2010/main" w="9525">
+                  <a14:hiddenLine xmlns:a14="http://schemas.microsoft.com/office/drawing/2010/main" xmlns="" w="9525">
                     <a:solidFill>
                       <a:srgbClr val="000000"/>
                     </a:solidFill>
@@ -16325,7 +16333,7 @@
               </a:ln>
               <a:extLst>
                 <a:ext uri="{91240B29-F687-4f45-9708-019B960494DF}">
-                  <a14:hiddenLine xmlns="" xmlns:a14="http://schemas.microsoft.com/office/drawing/2010/main" w="9525">
+                  <a14:hiddenLine xmlns:a14="http://schemas.microsoft.com/office/drawing/2010/main" xmlns="" w="9525">
                     <a:solidFill>
                       <a:srgbClr val="000000"/>
                     </a:solidFill>
@@ -16387,7 +16395,7 @@
               </a:ln>
               <a:extLst>
                 <a:ext uri="{91240B29-F687-4f45-9708-019B960494DF}">
-                  <a14:hiddenLine xmlns="" xmlns:a14="http://schemas.microsoft.com/office/drawing/2010/main" w="9525">
+                  <a14:hiddenLine xmlns:a14="http://schemas.microsoft.com/office/drawing/2010/main" xmlns="" w="9525">
                     <a:solidFill>
                       <a:srgbClr val="000000"/>
                     </a:solidFill>
@@ -16477,7 +16485,7 @@
               </a:ln>
               <a:extLst>
                 <a:ext uri="{91240B29-F687-4f45-9708-019B960494DF}">
-                  <a14:hiddenLine xmlns="" xmlns:a14="http://schemas.microsoft.com/office/drawing/2010/main" w="9525">
+                  <a14:hiddenLine xmlns:a14="http://schemas.microsoft.com/office/drawing/2010/main" xmlns="" w="9525">
                     <a:solidFill>
                       <a:srgbClr val="000000"/>
                     </a:solidFill>
@@ -16567,7 +16575,7 @@
               </a:ln>
               <a:extLst>
                 <a:ext uri="{91240B29-F687-4f45-9708-019B960494DF}">
-                  <a14:hiddenLine xmlns="" xmlns:a14="http://schemas.microsoft.com/office/drawing/2010/main" w="9525">
+                  <a14:hiddenLine xmlns:a14="http://schemas.microsoft.com/office/drawing/2010/main" xmlns="" w="9525">
                     <a:solidFill>
                       <a:srgbClr val="000000"/>
                     </a:solidFill>
@@ -16632,7 +16640,7 @@
               </a:ln>
               <a:extLst>
                 <a:ext uri="{91240B29-F687-4f45-9708-019B960494DF}">
-                  <a14:hiddenLine xmlns="" xmlns:a14="http://schemas.microsoft.com/office/drawing/2010/main" w="9525">
+                  <a14:hiddenLine xmlns:a14="http://schemas.microsoft.com/office/drawing/2010/main" xmlns="" w="9525">
                     <a:solidFill>
                       <a:srgbClr val="000000"/>
                     </a:solidFill>
@@ -16752,7 +16760,7 @@
               </a:ln>
               <a:extLst>
                 <a:ext uri="{91240B29-F687-4f45-9708-019B960494DF}">
-                  <a14:hiddenLine xmlns="" xmlns:a14="http://schemas.microsoft.com/office/drawing/2010/main" w="9525">
+                  <a14:hiddenLine xmlns:a14="http://schemas.microsoft.com/office/drawing/2010/main" xmlns="" w="9525">
                     <a:solidFill>
                       <a:srgbClr val="000000"/>
                     </a:solidFill>
@@ -16833,7 +16841,7 @@
               </a:ln>
               <a:extLst>
                 <a:ext uri="{91240B29-F687-4f45-9708-019B960494DF}">
-                  <a14:hiddenLine xmlns="" xmlns:a14="http://schemas.microsoft.com/office/drawing/2010/main" w="9525">
+                  <a14:hiddenLine xmlns:a14="http://schemas.microsoft.com/office/drawing/2010/main" xmlns="" w="9525">
                     <a:solidFill>
                       <a:srgbClr val="000000"/>
                     </a:solidFill>
@@ -16948,7 +16956,7 @@
               </a:ln>
               <a:extLst>
                 <a:ext uri="{91240B29-F687-4f45-9708-019B960494DF}">
-                  <a14:hiddenLine xmlns="" xmlns:a14="http://schemas.microsoft.com/office/drawing/2010/main" w="9525">
+                  <a14:hiddenLine xmlns:a14="http://schemas.microsoft.com/office/drawing/2010/main" xmlns="" w="9525">
                     <a:solidFill>
                       <a:srgbClr val="000000"/>
                     </a:solidFill>
@@ -17038,7 +17046,7 @@
               </a:ln>
               <a:extLst>
                 <a:ext uri="{91240B29-F687-4f45-9708-019B960494DF}">
-                  <a14:hiddenLine xmlns="" xmlns:a14="http://schemas.microsoft.com/office/drawing/2010/main" w="9525">
+                  <a14:hiddenLine xmlns:a14="http://schemas.microsoft.com/office/drawing/2010/main" xmlns="" w="9525">
                     <a:solidFill>
                       <a:srgbClr val="000000"/>
                     </a:solidFill>
@@ -17103,7 +17111,7 @@
               </a:ln>
               <a:extLst>
                 <a:ext uri="{91240B29-F687-4f45-9708-019B960494DF}">
-                  <a14:hiddenLine xmlns="" xmlns:a14="http://schemas.microsoft.com/office/drawing/2010/main" w="9525">
+                  <a14:hiddenLine xmlns:a14="http://schemas.microsoft.com/office/drawing/2010/main" xmlns="" w="9525">
                     <a:solidFill>
                       <a:srgbClr val="000000"/>
                     </a:solidFill>
@@ -17193,7 +17201,7 @@
               </a:ln>
               <a:extLst>
                 <a:ext uri="{91240B29-F687-4f45-9708-019B960494DF}">
-                  <a14:hiddenLine xmlns="" xmlns:a14="http://schemas.microsoft.com/office/drawing/2010/main" w="9525">
+                  <a14:hiddenLine xmlns:a14="http://schemas.microsoft.com/office/drawing/2010/main" xmlns="" w="9525">
                     <a:solidFill>
                       <a:srgbClr val="000000"/>
                     </a:solidFill>
@@ -17261,7 +17269,7 @@
               </a:ln>
               <a:extLst>
                 <a:ext uri="{91240B29-F687-4f45-9708-019B960494DF}">
-                  <a14:hiddenLine xmlns="" xmlns:a14="http://schemas.microsoft.com/office/drawing/2010/main" w="9525">
+                  <a14:hiddenLine xmlns:a14="http://schemas.microsoft.com/office/drawing/2010/main" xmlns="" w="9525">
                     <a:solidFill>
                       <a:srgbClr val="000000"/>
                     </a:solidFill>
@@ -17351,7 +17359,7 @@
               </a:ln>
               <a:extLst>
                 <a:ext uri="{91240B29-F687-4f45-9708-019B960494DF}">
-                  <a14:hiddenLine xmlns="" xmlns:a14="http://schemas.microsoft.com/office/drawing/2010/main" w="9525">
+                  <a14:hiddenLine xmlns:a14="http://schemas.microsoft.com/office/drawing/2010/main" xmlns="" w="9525">
                     <a:solidFill>
                       <a:srgbClr val="000000"/>
                     </a:solidFill>
@@ -17419,7 +17427,7 @@
               </a:ln>
               <a:extLst>
                 <a:ext uri="{91240B29-F687-4f45-9708-019B960494DF}">
-                  <a14:hiddenLine xmlns="" xmlns:a14="http://schemas.microsoft.com/office/drawing/2010/main" w="9525">
+                  <a14:hiddenLine xmlns:a14="http://schemas.microsoft.com/office/drawing/2010/main" xmlns="" w="9525">
                     <a:solidFill>
                       <a:srgbClr val="000000"/>
                     </a:solidFill>
@@ -17509,7 +17517,7 @@
               </a:ln>
               <a:extLst>
                 <a:ext uri="{91240B29-F687-4f45-9708-019B960494DF}">
-                  <a14:hiddenLine xmlns="" xmlns:a14="http://schemas.microsoft.com/office/drawing/2010/main" w="9525">
+                  <a14:hiddenLine xmlns:a14="http://schemas.microsoft.com/office/drawing/2010/main" xmlns="" w="9525">
                     <a:solidFill>
                       <a:srgbClr val="000000"/>
                     </a:solidFill>
@@ -17543,7 +17551,7 @@
               </a:ln>
               <a:extLst>
                 <a:ext uri="{91240B29-F687-4f45-9708-019B960494DF}">
-                  <a14:hiddenLine xmlns="" xmlns:a14="http://schemas.microsoft.com/office/drawing/2010/main" w="9525">
+                  <a14:hiddenLine xmlns:a14="http://schemas.microsoft.com/office/drawing/2010/main" xmlns="" w="9525">
                     <a:solidFill>
                       <a:srgbClr val="000000"/>
                     </a:solidFill>
@@ -17689,7 +17697,7 @@
               <a:pPr>
                 <a:defRPr/>
               </a:pPr>
-              <a:t>ו'/אב/תשפ"ג</a:t>
+              <a:t>כ"ד/אב/תשפ"ג</a:t>
             </a:fld>
             <a:endParaRPr lang="he-IL"/>
           </a:p>
@@ -25043,13 +25051,18 @@
           <a:lstStyle/>
           <a:p>
             <a:r>
-              <a:rPr lang="he-IL" sz="4900" b="1" dirty="0">
+              <a:rPr lang="he-IL" sz="4900" b="1">
                 <a:solidFill>
                   <a:schemeClr val="bg1"/>
                 </a:solidFill>
               </a:rPr>
-              <a:t>231201</a:t>
+              <a:t>231202</a:t>
             </a:r>
+            <a:endParaRPr lang="he-IL" sz="4900" b="1" dirty="0">
+              <a:solidFill>
+                <a:schemeClr val="bg1"/>
+              </a:solidFill>
+            </a:endParaRPr>
           </a:p>
         </p:txBody>
       </p:sp>

</xml_diff>